<commit_message>
Teil 1 der präsi weitergeführt
</commit_message>
<xml_diff>
--- a/Präsentation.pptx
+++ b/Präsentation.pptx
@@ -164,7 +164,7 @@
   </p:defaultTextStyle>
   <p:extLst>
     <p:ext uri="{521415D9-36F7-43E2-AB2F-B90AF26B5E84}">
-      <p14:sectionLst xmlns:p14="http://schemas.microsoft.com/office/powerpoint/2010/main">
+      <p14:sectionLst xmlns:p14="http://schemas.microsoft.com/office/powerpoint/2010/main" xmlns="">
         <p14:section name="Fachlabor IT" id="{DED19D9C-E72F-4B67-BED8-A255EA795F3F}">
           <p14:sldIdLst>
             <p14:sldId id="256"/>
@@ -219,7 +219,7 @@
       </p14:sectionLst>
     </p:ext>
     <p:ext uri="{EFAFB233-063F-42B5-8137-9DF3F51BA10A}">
-      <p15:sldGuideLst xmlns:p15="http://schemas.microsoft.com/office/powerpoint/2012/main">
+      <p15:sldGuideLst xmlns:p15="http://schemas.microsoft.com/office/powerpoint/2012/main" xmlns="">
         <p15:guide id="1" orient="horz" pos="935" userDrawn="1">
           <p15:clr>
             <a:srgbClr val="A4A3A4"/>
@@ -233,7 +233,7 @@
       </p15:sldGuideLst>
     </p:ext>
     <p:ext uri="{2D200454-40CA-4A62-9FC3-DE9A4176ACB9}">
-      <p15:notesGuideLst xmlns:p15="http://schemas.microsoft.com/office/powerpoint/2012/main">
+      <p15:notesGuideLst xmlns:p15="http://schemas.microsoft.com/office/powerpoint/2012/main" xmlns="">
         <p15:guide id="1" orient="horz" pos="3132">
           <p15:clr>
             <a:srgbClr val="A4A3A4"/>
@@ -473,7 +473,7 @@
     </p:spTree>
     <p:extLst>
       <p:ext uri="{BB962C8B-B14F-4D97-AF65-F5344CB8AC3E}">
-        <p14:creationId xmlns:p14="http://schemas.microsoft.com/office/powerpoint/2010/main" val="2340697763"/>
+        <p14:creationId xmlns:p14="http://schemas.microsoft.com/office/powerpoint/2010/main" xmlns="" val="2340697763"/>
       </p:ext>
     </p:extLst>
   </p:cSld>
@@ -803,7 +803,7 @@
     </p:spTree>
     <p:extLst>
       <p:ext uri="{BB962C8B-B14F-4D97-AF65-F5344CB8AC3E}">
-        <p14:creationId xmlns:p14="http://schemas.microsoft.com/office/powerpoint/2010/main" val="3722097906"/>
+        <p14:creationId xmlns:p14="http://schemas.microsoft.com/office/powerpoint/2010/main" xmlns="" val="3722097906"/>
       </p:ext>
     </p:extLst>
   </p:cSld>
@@ -1027,7 +1027,7 @@
     </p:spTree>
     <p:extLst>
       <p:ext uri="{BB962C8B-B14F-4D97-AF65-F5344CB8AC3E}">
-        <p14:creationId xmlns:p14="http://schemas.microsoft.com/office/powerpoint/2010/main" val="3197195781"/>
+        <p14:creationId xmlns:p14="http://schemas.microsoft.com/office/powerpoint/2010/main" xmlns="" val="3197195781"/>
       </p:ext>
     </p:extLst>
   </p:cSld>
@@ -1064,12 +1064,7 @@
             <p:ph type="sldImg"/>
           </p:nvPr>
         </p:nvSpPr>
-        <p:spPr>
-          <a:xfrm>
-            <a:off x="896938" y="747713"/>
-            <a:ext cx="4968875" cy="3725862"/>
-          </a:xfrm>
-        </p:spPr>
+        <p:spPr/>
       </p:sp>
       <p:sp>
         <p:nvSpPr>
@@ -1083,21 +1078,28 @@
         </p:nvSpPr>
         <p:spPr/>
         <p:txBody>
-          <a:bodyPr/>
-          <a:lstStyle/>
-          <a:p>
-            <a:r>
-              <a:rPr lang="de-DE" dirty="0"/>
-              <a:t>Aufruf in Warteschlange</a:t>
-            </a:r>
-            <a:r>
-              <a:rPr lang="de-DE" baseline="0" dirty="0"/>
-              <a:t> abhängig von Fahrtrichtung: </a:t>
-            </a:r>
-            <a:r>
-              <a:rPr lang="de-DE" dirty="0"/>
-              <a:t>Wenn hoch gefahren wird, wird in die Abwärtswarteschlange einsortieren, et v.v.</a:t>
-            </a:r>
+          <a:bodyPr>
+            <a:normAutofit/>
+          </a:bodyPr>
+          <a:lstStyle/>
+          <a:p>
+            <a:r>
+              <a:rPr lang="de-DE" dirty="0" smtClean="0"/>
+              <a:t>Hier Vorführen der Features Intelligent</a:t>
+            </a:r>
+            <a:r>
+              <a:rPr lang="de-DE" baseline="0" dirty="0" smtClean="0"/>
+              <a:t> und Komfortabel an der Simulation, sowie Aufzeigen der </a:t>
+            </a:r>
+            <a:r>
+              <a:rPr lang="de-DE" baseline="0" dirty="0" err="1" smtClean="0"/>
+              <a:t>allgm</a:t>
+            </a:r>
+            <a:r>
+              <a:rPr lang="de-DE" baseline="0" dirty="0" smtClean="0"/>
+              <a:t>. Funktionsweise der Positions- und Richtungsleuchten</a:t>
+            </a:r>
+            <a:endParaRPr lang="de-DE" dirty="0"/>
           </a:p>
         </p:txBody>
       </p:sp>
@@ -1124,18 +1126,13 @@
               <a:pPr>
                 <a:defRPr/>
               </a:pPr>
-              <a:t>11</a:t>
+              <a:t>4</a:t>
             </a:fld>
             <a:endParaRPr lang="de-DE"/>
           </a:p>
         </p:txBody>
       </p:sp>
     </p:spTree>
-    <p:extLst>
-      <p:ext uri="{BB962C8B-B14F-4D97-AF65-F5344CB8AC3E}">
-        <p14:creationId xmlns:p14="http://schemas.microsoft.com/office/powerpoint/2010/main" val="2132037008"/>
-      </p:ext>
-    </p:extLst>
   </p:cSld>
   <p:clrMapOvr>
     <a:masterClrMapping/>
@@ -1192,7 +1189,18 @@
           <a:bodyPr/>
           <a:lstStyle/>
           <a:p>
-            <a:endParaRPr lang="de-DE" dirty="0"/>
+            <a:r>
+              <a:rPr lang="de-DE" dirty="0"/>
+              <a:t>Aufruf in Warteschlange</a:t>
+            </a:r>
+            <a:r>
+              <a:rPr lang="de-DE" baseline="0" dirty="0"/>
+              <a:t> abhängig von Fahrtrichtung: </a:t>
+            </a:r>
+            <a:r>
+              <a:rPr lang="de-DE" dirty="0"/>
+              <a:t>Wenn hoch gefahren wird, wird in die Abwärtswarteschlange einsortieren, et v.v.</a:t>
+            </a:r>
           </a:p>
         </p:txBody>
       </p:sp>
@@ -1219,7 +1227,7 @@
               <a:pPr>
                 <a:defRPr/>
               </a:pPr>
-              <a:t>15</a:t>
+              <a:t>11</a:t>
             </a:fld>
             <a:endParaRPr lang="de-DE"/>
           </a:p>
@@ -1228,7 +1236,7 @@
     </p:spTree>
     <p:extLst>
       <p:ext uri="{BB962C8B-B14F-4D97-AF65-F5344CB8AC3E}">
-        <p14:creationId xmlns:p14="http://schemas.microsoft.com/office/powerpoint/2010/main" val="3022281367"/>
+        <p14:creationId xmlns:p14="http://schemas.microsoft.com/office/powerpoint/2010/main" xmlns="" val="2132037008"/>
       </p:ext>
     </p:extLst>
   </p:cSld>
@@ -1257,6 +1265,101 @@
       </p:grpSpPr>
       <p:sp>
         <p:nvSpPr>
+          <p:cNvPr id="2" name="Folienbildplatzhalter 1"/>
+          <p:cNvSpPr>
+            <a:spLocks noGrp="1" noRot="1" noChangeAspect="1"/>
+          </p:cNvSpPr>
+          <p:nvPr>
+            <p:ph type="sldImg"/>
+          </p:nvPr>
+        </p:nvSpPr>
+        <p:spPr>
+          <a:xfrm>
+            <a:off x="896938" y="747713"/>
+            <a:ext cx="4968875" cy="3725862"/>
+          </a:xfrm>
+        </p:spPr>
+      </p:sp>
+      <p:sp>
+        <p:nvSpPr>
+          <p:cNvPr id="3" name="Notizenplatzhalter 2"/>
+          <p:cNvSpPr>
+            <a:spLocks noGrp="1"/>
+          </p:cNvSpPr>
+          <p:nvPr>
+            <p:ph type="body" idx="1"/>
+          </p:nvPr>
+        </p:nvSpPr>
+        <p:spPr/>
+        <p:txBody>
+          <a:bodyPr/>
+          <a:lstStyle/>
+          <a:p>
+            <a:endParaRPr lang="de-DE" dirty="0"/>
+          </a:p>
+        </p:txBody>
+      </p:sp>
+      <p:sp>
+        <p:nvSpPr>
+          <p:cNvPr id="4" name="Foliennummernplatzhalter 3"/>
+          <p:cNvSpPr>
+            <a:spLocks noGrp="1"/>
+          </p:cNvSpPr>
+          <p:nvPr>
+            <p:ph type="sldNum" sz="quarter" idx="10"/>
+          </p:nvPr>
+        </p:nvSpPr>
+        <p:spPr/>
+        <p:txBody>
+          <a:bodyPr/>
+          <a:lstStyle/>
+          <a:p>
+            <a:pPr>
+              <a:defRPr/>
+            </a:pPr>
+            <a:fld id="{D0E03ECB-004C-4CA3-8342-0B234B233A94}" type="slidenum">
+              <a:rPr lang="de-DE" smtClean="0"/>
+              <a:pPr>
+                <a:defRPr/>
+              </a:pPr>
+              <a:t>15</a:t>
+            </a:fld>
+            <a:endParaRPr lang="de-DE"/>
+          </a:p>
+        </p:txBody>
+      </p:sp>
+    </p:spTree>
+    <p:extLst>
+      <p:ext uri="{BB962C8B-B14F-4D97-AF65-F5344CB8AC3E}">
+        <p14:creationId xmlns:p14="http://schemas.microsoft.com/office/powerpoint/2010/main" xmlns="" val="3022281367"/>
+      </p:ext>
+    </p:extLst>
+  </p:cSld>
+  <p:clrMapOvr>
+    <a:masterClrMapping/>
+  </p:clrMapOvr>
+</p:notes>
+</file>
+
+<file path=ppt/notesSlides/notesSlide5.xml><?xml version="1.0" encoding="utf-8"?>
+<p:notes xmlns:a="http://schemas.openxmlformats.org/drawingml/2006/main" xmlns:r="http://schemas.openxmlformats.org/officeDocument/2006/relationships" xmlns:p="http://schemas.openxmlformats.org/presentationml/2006/main">
+  <p:cSld>
+    <p:spTree>
+      <p:nvGrpSpPr>
+        <p:cNvPr id="1" name=""/>
+        <p:cNvGrpSpPr/>
+        <p:nvPr/>
+      </p:nvGrpSpPr>
+      <p:grpSpPr>
+        <a:xfrm>
+          <a:off x="0" y="0"/>
+          <a:ext cx="0" cy="0"/>
+          <a:chOff x="0" y="0"/>
+          <a:chExt cx="0" cy="0"/>
+        </a:xfrm>
+      </p:grpSpPr>
+      <p:sp>
+        <p:nvSpPr>
           <p:cNvPr id="29698" name="Rectangle 7"/>
           <p:cNvSpPr>
             <a:spLocks noGrp="1" noChangeArrowheads="1"/>
@@ -1332,7 +1435,7 @@
     </p:spTree>
     <p:extLst>
       <p:ext uri="{BB962C8B-B14F-4D97-AF65-F5344CB8AC3E}">
-        <p14:creationId xmlns:p14="http://schemas.microsoft.com/office/powerpoint/2010/main" val="3140753640"/>
+        <p14:creationId xmlns:p14="http://schemas.microsoft.com/office/powerpoint/2010/main" xmlns="" val="3140753640"/>
       </p:ext>
     </p:extLst>
   </p:cSld>
@@ -1456,7 +1559,7 @@
         </p:blipFill>
         <p:spPr bwMode="auto">
           <a:xfrm>
-            <a:off x="385764" y="330214"/>
+            <a:off x="385764" y="330215"/>
             <a:ext cx="8291512" cy="5756275"/>
           </a:xfrm>
           <a:prstGeom prst="rect">
@@ -1481,7 +1584,7 @@
         </p:nvSpPr>
         <p:spPr bwMode="auto">
           <a:xfrm>
-            <a:off x="536582" y="3967163"/>
+            <a:off x="536584" y="3967163"/>
             <a:ext cx="8099425" cy="792000"/>
           </a:xfrm>
           <a:prstGeom prst="rect">
@@ -1523,7 +1626,7 @@
         </p:nvSpPr>
         <p:spPr>
           <a:xfrm>
-            <a:off x="8028383" y="6238875"/>
+            <a:off x="8028385" y="6238875"/>
             <a:ext cx="787647" cy="228600"/>
           </a:xfrm>
           <a:prstGeom prst="rect">
@@ -1590,7 +1693,7 @@
         </p:nvSpPr>
         <p:spPr>
           <a:xfrm>
-            <a:off x="722313" y="669180"/>
+            <a:off x="722313" y="669181"/>
             <a:ext cx="7772400" cy="353943"/>
           </a:xfrm>
         </p:spPr>
@@ -1630,7 +1733,7 @@
         </p:nvSpPr>
         <p:spPr>
           <a:xfrm>
-            <a:off x="738195" y="1401763"/>
+            <a:off x="738197" y="1401763"/>
             <a:ext cx="7342187" cy="2154436"/>
           </a:xfrm>
         </p:spPr>
@@ -1772,7 +1875,7 @@
   </p:clrMapOvr>
   <p:extLst mod="1">
     <p:ext uri="{DCECCB84-F9BA-43D5-87BE-67443E8EF086}">
-      <p15:sldGuideLst xmlns:p15="http://schemas.microsoft.com/office/powerpoint/2012/main">
+      <p15:sldGuideLst xmlns:p15="http://schemas.microsoft.com/office/powerpoint/2012/main" xmlns="">
         <p15:guide id="1" orient="horz" pos="2160" userDrawn="1">
           <p15:clr>
             <a:srgbClr val="FBAE40"/>
@@ -1849,7 +1952,7 @@
         </p:nvSpPr>
         <p:spPr>
           <a:xfrm>
-            <a:off x="722313" y="4099136"/>
+            <a:off x="722313" y="4099137"/>
             <a:ext cx="7772400" cy="307777"/>
           </a:xfrm>
         </p:spPr>
@@ -2003,7 +2106,7 @@
         </p:nvSpPr>
         <p:spPr>
           <a:xfrm>
-            <a:off x="738189" y="1401770"/>
+            <a:off x="738189" y="1401771"/>
             <a:ext cx="3594100" cy="2769989"/>
           </a:xfrm>
         </p:spPr>
@@ -2087,7 +2190,7 @@
         </p:nvSpPr>
         <p:spPr>
           <a:xfrm>
-            <a:off x="4484695" y="1401770"/>
+            <a:off x="4484697" y="1401771"/>
             <a:ext cx="3595687" cy="2769989"/>
           </a:xfrm>
         </p:spPr>
@@ -2238,7 +2341,7 @@
         </p:nvSpPr>
         <p:spPr>
           <a:xfrm>
-            <a:off x="457200" y="669179"/>
+            <a:off x="457200" y="669180"/>
             <a:ext cx="8229600" cy="353943"/>
           </a:xfrm>
         </p:spPr>
@@ -2334,7 +2437,7 @@
         </p:nvSpPr>
         <p:spPr>
           <a:xfrm>
-            <a:off x="457200" y="2174888"/>
+            <a:off x="457200" y="2174889"/>
             <a:ext cx="4040188" cy="2031325"/>
           </a:xfrm>
         </p:spPr>
@@ -2418,7 +2521,7 @@
         </p:nvSpPr>
         <p:spPr>
           <a:xfrm>
-            <a:off x="4645032" y="1436211"/>
+            <a:off x="4645033" y="1436211"/>
             <a:ext cx="4041775" cy="738664"/>
           </a:xfrm>
         </p:spPr>
@@ -2483,7 +2586,7 @@
         </p:nvSpPr>
         <p:spPr>
           <a:xfrm>
-            <a:off x="4645032" y="2174888"/>
+            <a:off x="4645033" y="2174889"/>
             <a:ext cx="4041775" cy="2031325"/>
           </a:xfrm>
         </p:spPr>
@@ -2798,7 +2901,7 @@
         </p:nvSpPr>
         <p:spPr bwMode="auto">
           <a:xfrm>
-            <a:off x="8636031" y="609614"/>
+            <a:off x="8636031" y="609615"/>
             <a:ext cx="180000" cy="487363"/>
           </a:xfrm>
           <a:prstGeom prst="roundRect">
@@ -2848,7 +2951,7 @@
         </p:nvSpPr>
         <p:spPr bwMode="auto">
           <a:xfrm>
-            <a:off x="8636031" y="1162064"/>
+            <a:off x="8636031" y="1162065"/>
             <a:ext cx="180000" cy="487363"/>
           </a:xfrm>
           <a:prstGeom prst="roundRect">
@@ -2891,7 +2994,7 @@
         </p:nvSpPr>
         <p:spPr bwMode="auto">
           <a:xfrm>
-            <a:off x="8636031" y="1714503"/>
+            <a:off x="8636031" y="1714504"/>
             <a:ext cx="180000" cy="487363"/>
           </a:xfrm>
           <a:prstGeom prst="roundRect">
@@ -2934,8 +3037,8 @@
         </p:nvSpPr>
         <p:spPr bwMode="auto">
           <a:xfrm>
-            <a:off x="8648374" y="904875"/>
-            <a:ext cx="247184" cy="230832"/>
+            <a:off x="8648376" y="904875"/>
+            <a:ext cx="247183" cy="230832"/>
           </a:xfrm>
           <a:prstGeom prst="rect">
             <a:avLst/>
@@ -2981,8 +3084,8 @@
         </p:nvSpPr>
         <p:spPr bwMode="auto">
           <a:xfrm>
-            <a:off x="8648374" y="1457325"/>
-            <a:ext cx="247184" cy="230832"/>
+            <a:off x="8648376" y="1457325"/>
+            <a:ext cx="247183" cy="230832"/>
           </a:xfrm>
           <a:prstGeom prst="rect">
             <a:avLst/>
@@ -3028,8 +3131,8 @@
         </p:nvSpPr>
         <p:spPr bwMode="auto">
           <a:xfrm>
-            <a:off x="8648374" y="2014538"/>
-            <a:ext cx="247184" cy="230832"/>
+            <a:off x="8648376" y="2014539"/>
+            <a:ext cx="247183" cy="230832"/>
           </a:xfrm>
           <a:prstGeom prst="rect">
             <a:avLst/>
@@ -3150,7 +3253,7 @@
         </p:nvSpPr>
         <p:spPr bwMode="auto">
           <a:xfrm>
-            <a:off x="722313" y="669180"/>
+            <a:off x="722313" y="669181"/>
             <a:ext cx="7772400" cy="353943"/>
           </a:xfrm>
           <a:prstGeom prst="rect">
@@ -3193,7 +3296,7 @@
         </p:nvSpPr>
         <p:spPr bwMode="auto">
           <a:xfrm>
-            <a:off x="738195" y="1401763"/>
+            <a:off x="738197" y="1401763"/>
             <a:ext cx="7342187" cy="1341906"/>
           </a:xfrm>
           <a:prstGeom prst="rect">
@@ -3333,7 +3436,7 @@
         </p:nvSpPr>
         <p:spPr>
           <a:xfrm>
-            <a:off x="8028383" y="6238875"/>
+            <a:off x="8028385" y="6238875"/>
             <a:ext cx="787647" cy="228600"/>
           </a:xfrm>
           <a:prstGeom prst="rect">
@@ -3389,7 +3492,7 @@
           </a:ln>
           <a:extLst>
             <a:ext uri="{91240B29-F687-4F45-9708-019B960494DF}">
-              <a14:hiddenLine xmlns:a14="http://schemas.microsoft.com/office/drawing/2010/main" w="9525">
+              <a14:hiddenLine xmlns:a14="http://schemas.microsoft.com/office/drawing/2010/main" xmlns="" w="9525">
                 <a:solidFill>
                   <a:srgbClr val="000000"/>
                 </a:solidFill>
@@ -3424,7 +3527,7 @@
         </p:blipFill>
         <p:spPr>
           <a:xfrm>
-            <a:off x="7729372" y="116646"/>
+            <a:off x="7729374" y="116647"/>
             <a:ext cx="875083" cy="315789"/>
           </a:xfrm>
           <a:prstGeom prst="rect">
@@ -3442,8 +3545,8 @@
         </p:nvSpPr>
         <p:spPr bwMode="auto">
           <a:xfrm>
-            <a:off x="8645296" y="2564904"/>
-            <a:ext cx="247184" cy="230832"/>
+            <a:off x="8645298" y="2564904"/>
+            <a:ext cx="247183" cy="230832"/>
           </a:xfrm>
           <a:prstGeom prst="rect">
             <a:avLst/>
@@ -3489,7 +3592,7 @@
         </p:nvSpPr>
         <p:spPr bwMode="auto">
           <a:xfrm>
-            <a:off x="8636643" y="2808599"/>
+            <a:off x="8636643" y="2808600"/>
             <a:ext cx="179388" cy="487363"/>
           </a:xfrm>
           <a:prstGeom prst="roundRect">
@@ -3505,7 +3608,7 @@
           </a:ln>
           <a:extLst>
             <a:ext uri="{91240B29-F687-4F45-9708-019B960494DF}">
-              <a14:hiddenLine xmlns:a14="http://schemas.microsoft.com/office/drawing/2010/main" w="9525">
+              <a14:hiddenLine xmlns:a14="http://schemas.microsoft.com/office/drawing/2010/main" xmlns="" w="9525">
                 <a:solidFill>
                   <a:srgbClr val="000000"/>
                 </a:solidFill>
@@ -3537,8 +3640,8 @@
         </p:nvSpPr>
         <p:spPr bwMode="auto">
           <a:xfrm>
-            <a:off x="8645941" y="3109714"/>
-            <a:ext cx="247184" cy="230832"/>
+            <a:off x="8645943" y="3109715"/>
+            <a:ext cx="247183" cy="230832"/>
           </a:xfrm>
           <a:prstGeom prst="rect">
             <a:avLst/>
@@ -3600,7 +3703,7 @@
           </a:ln>
           <a:extLst>
             <a:ext uri="{91240B29-F687-4F45-9708-019B960494DF}">
-              <a14:hiddenLine xmlns:a14="http://schemas.microsoft.com/office/drawing/2010/main" w="9525">
+              <a14:hiddenLine xmlns:a14="http://schemas.microsoft.com/office/drawing/2010/main" xmlns="" w="9525">
                 <a:solidFill>
                   <a:srgbClr val="000000"/>
                 </a:solidFill>
@@ -3632,8 +3735,8 @@
         </p:nvSpPr>
         <p:spPr bwMode="auto">
           <a:xfrm>
-            <a:off x="8646190" y="3649390"/>
-            <a:ext cx="247184" cy="230832"/>
+            <a:off x="8646192" y="3649391"/>
+            <a:ext cx="247183" cy="230832"/>
           </a:xfrm>
           <a:prstGeom prst="rect">
             <a:avLst/>
@@ -4118,7 +4221,7 @@
         </p:nvSpPr>
         <p:spPr bwMode="auto">
           <a:xfrm>
-            <a:off x="365727" y="620702"/>
+            <a:off x="365727" y="620704"/>
             <a:ext cx="8229600" cy="1684337"/>
           </a:xfrm>
           <a:prstGeom prst="rect">
@@ -4160,8 +4263,8 @@
         </p:nvSpPr>
         <p:spPr bwMode="auto">
           <a:xfrm>
-            <a:off x="553027" y="3740710"/>
-            <a:ext cx="8229600" cy="1269130"/>
+            <a:off x="553027" y="3740709"/>
+            <a:ext cx="8229600" cy="1269131"/>
           </a:xfrm>
           <a:prstGeom prst="rect">
             <a:avLst/>
@@ -4207,8 +4310,8 @@
         </p:blipFill>
         <p:spPr bwMode="auto">
           <a:xfrm>
-            <a:off x="755590" y="5373216"/>
-            <a:ext cx="2428875" cy="390526"/>
+            <a:off x="755592" y="5373217"/>
+            <a:ext cx="2428875" cy="390527"/>
           </a:xfrm>
           <a:prstGeom prst="rect">
             <a:avLst/>
@@ -4226,8 +4329,8 @@
         </p:nvSpPr>
         <p:spPr bwMode="auto">
           <a:xfrm>
-            <a:off x="637187" y="3742982"/>
-            <a:ext cx="7974552" cy="1269130"/>
+            <a:off x="637187" y="3742981"/>
+            <a:ext cx="7974552" cy="1269131"/>
           </a:xfrm>
           <a:prstGeom prst="rect">
             <a:avLst/>
@@ -4267,7 +4370,7 @@
         </p:nvSpPr>
         <p:spPr>
           <a:xfrm>
-            <a:off x="457214" y="3933056"/>
+            <a:off x="457216" y="3933056"/>
             <a:ext cx="8229599" cy="849720"/>
           </a:xfrm>
           <a:prstGeom prst="rect">
@@ -4337,7 +4440,7 @@
         </p:blipFill>
         <p:spPr>
           <a:xfrm>
-            <a:off x="7668344" y="5315845"/>
+            <a:off x="7668344" y="5315846"/>
             <a:ext cx="808562" cy="543876"/>
           </a:xfrm>
           <a:prstGeom prst="rect">
@@ -4402,7 +4505,7 @@
         </p:nvSpPr>
         <p:spPr bwMode="auto">
           <a:xfrm>
-            <a:off x="552093" y="2276886"/>
+            <a:off x="552093" y="2276888"/>
             <a:ext cx="8085762" cy="862481"/>
           </a:xfrm>
           <a:prstGeom prst="rect">
@@ -4557,7 +4660,7 @@
         </p:nvSpPr>
         <p:spPr>
           <a:xfrm>
-            <a:off x="8554874" y="1790614"/>
+            <a:off x="8554874" y="1790616"/>
             <a:ext cx="337606" cy="307777"/>
           </a:xfrm>
           <a:prstGeom prst="rect">
@@ -4599,7 +4702,7 @@
         </p:blipFill>
         <p:spPr>
           <a:xfrm>
-            <a:off x="2042413" y="1318872"/>
+            <a:off x="2042415" y="1318872"/>
             <a:ext cx="5059201" cy="4558400"/>
           </a:xfrm>
           <a:prstGeom prst="rect">
@@ -4610,7 +4713,7 @@
     </p:spTree>
     <p:extLst>
       <p:ext uri="{BB962C8B-B14F-4D97-AF65-F5344CB8AC3E}">
-        <p14:creationId xmlns:p14="http://schemas.microsoft.com/office/powerpoint/2010/main" val="1366462204"/>
+        <p14:creationId xmlns:p14="http://schemas.microsoft.com/office/powerpoint/2010/main" xmlns="" val="1366462204"/>
       </p:ext>
     </p:extLst>
   </p:cSld>
@@ -4748,7 +4851,7 @@
         </p:nvSpPr>
         <p:spPr>
           <a:xfrm>
-            <a:off x="8554874" y="1790614"/>
+            <a:off x="8554874" y="1790616"/>
             <a:ext cx="337606" cy="307777"/>
           </a:xfrm>
           <a:prstGeom prst="rect">
@@ -4812,8 +4915,8 @@
         </p:blipFill>
         <p:spPr>
           <a:xfrm>
-            <a:off x="899592" y="1187582"/>
-            <a:ext cx="6863940" cy="2139818"/>
+            <a:off x="899592" y="1187581"/>
+            <a:ext cx="6863940" cy="2139819"/>
           </a:xfrm>
           <a:prstGeom prst="rect">
             <a:avLst/>
@@ -4823,7 +4926,7 @@
     </p:spTree>
     <p:extLst>
       <p:ext uri="{BB962C8B-B14F-4D97-AF65-F5344CB8AC3E}">
-        <p14:creationId xmlns:p14="http://schemas.microsoft.com/office/powerpoint/2010/main" val="456857022"/>
+        <p14:creationId xmlns:p14="http://schemas.microsoft.com/office/powerpoint/2010/main" xmlns="" val="456857022"/>
       </p:ext>
     </p:extLst>
   </p:cSld>
@@ -4884,7 +4987,7 @@
         </p:nvSpPr>
         <p:spPr>
           <a:xfrm>
-            <a:off x="738202" y="1401763"/>
+            <a:off x="738204" y="1401763"/>
             <a:ext cx="7342187" cy="3570208"/>
           </a:xfrm>
         </p:spPr>
@@ -5006,7 +5109,7 @@
     </p:spTree>
     <p:extLst>
       <p:ext uri="{BB962C8B-B14F-4D97-AF65-F5344CB8AC3E}">
-        <p14:creationId xmlns:p14="http://schemas.microsoft.com/office/powerpoint/2010/main" val="275166036"/>
+        <p14:creationId xmlns:p14="http://schemas.microsoft.com/office/powerpoint/2010/main" xmlns="" val="275166036"/>
       </p:ext>
     </p:extLst>
   </p:cSld>
@@ -5068,7 +5171,7 @@
         </p:nvSpPr>
         <p:spPr>
           <a:xfrm>
-            <a:off x="738202" y="1401777"/>
+            <a:off x="738204" y="1401778"/>
             <a:ext cx="7342187" cy="4370427"/>
           </a:xfrm>
         </p:spPr>
@@ -5250,7 +5353,7 @@
         </p:nvSpPr>
         <p:spPr>
           <a:xfrm>
-            <a:off x="8554874" y="1790614"/>
+            <a:off x="8554874" y="1790616"/>
             <a:ext cx="337606" cy="307777"/>
           </a:xfrm>
           <a:prstGeom prst="rect">
@@ -5279,7 +5382,7 @@
     </p:spTree>
     <p:extLst>
       <p:ext uri="{BB962C8B-B14F-4D97-AF65-F5344CB8AC3E}">
-        <p14:creationId xmlns:p14="http://schemas.microsoft.com/office/powerpoint/2010/main" val="2200522923"/>
+        <p14:creationId xmlns:p14="http://schemas.microsoft.com/office/powerpoint/2010/main" xmlns="" val="2200522923"/>
       </p:ext>
     </p:extLst>
   </p:cSld>
@@ -5315,7 +5418,7 @@
         </p:nvSpPr>
         <p:spPr bwMode="auto">
           <a:xfrm>
-            <a:off x="565632" y="4005078"/>
+            <a:off x="565632" y="4005080"/>
             <a:ext cx="8085762" cy="862481"/>
           </a:xfrm>
           <a:prstGeom prst="rect">
@@ -5427,7 +5530,7 @@
         </p:nvSpPr>
         <p:spPr bwMode="auto">
           <a:xfrm>
-            <a:off x="8633677" y="2259324"/>
+            <a:off x="8633677" y="2259325"/>
             <a:ext cx="180000" cy="487363"/>
           </a:xfrm>
           <a:prstGeom prst="roundRect">
@@ -5470,7 +5573,7 @@
         </p:nvSpPr>
         <p:spPr>
           <a:xfrm>
-            <a:off x="8553577" y="2346914"/>
+            <a:off x="8553577" y="2346916"/>
             <a:ext cx="409614" cy="307777"/>
           </a:xfrm>
           <a:prstGeom prst="rect">
@@ -5512,7 +5615,7 @@
         </p:blipFill>
         <p:spPr>
           <a:xfrm>
-            <a:off x="2042413" y="1318872"/>
+            <a:off x="2042415" y="1318872"/>
             <a:ext cx="5059201" cy="4558400"/>
           </a:xfrm>
           <a:prstGeom prst="rect">
@@ -5523,7 +5626,7 @@
     </p:spTree>
     <p:extLst>
       <p:ext uri="{BB962C8B-B14F-4D97-AF65-F5344CB8AC3E}">
-        <p14:creationId xmlns:p14="http://schemas.microsoft.com/office/powerpoint/2010/main" val="2895349213"/>
+        <p14:creationId xmlns:p14="http://schemas.microsoft.com/office/powerpoint/2010/main" xmlns="" val="2895349213"/>
       </p:ext>
     </p:extLst>
   </p:cSld>
@@ -5559,7 +5662,7 @@
         <p:spPr bwMode="auto">
           <a:xfrm>
             <a:off x="565632" y="2834264"/>
-            <a:ext cx="8085762" cy="2033282"/>
+            <a:ext cx="8085762" cy="2033283"/>
           </a:xfrm>
           <a:prstGeom prst="rect">
             <a:avLst/>
@@ -5670,7 +5773,7 @@
         </p:nvSpPr>
         <p:spPr bwMode="auto">
           <a:xfrm>
-            <a:off x="8633677" y="2259324"/>
+            <a:off x="8633677" y="2259325"/>
             <a:ext cx="180000" cy="487363"/>
           </a:xfrm>
           <a:prstGeom prst="roundRect">
@@ -5713,7 +5816,7 @@
         </p:nvSpPr>
         <p:spPr>
           <a:xfrm>
-            <a:off x="8553577" y="2346914"/>
+            <a:off x="8553577" y="2346916"/>
             <a:ext cx="409614" cy="307777"/>
           </a:xfrm>
           <a:prstGeom prst="rect">
@@ -5754,7 +5857,7 @@
         </p:blipFill>
         <p:spPr>
           <a:xfrm>
-            <a:off x="1232137" y="1628814"/>
+            <a:off x="1232137" y="1628815"/>
             <a:ext cx="6679726" cy="4244285"/>
           </a:xfrm>
           <a:prstGeom prst="rect">
@@ -5765,7 +5868,7 @@
     </p:spTree>
     <p:extLst>
       <p:ext uri="{BB962C8B-B14F-4D97-AF65-F5344CB8AC3E}">
-        <p14:creationId xmlns:p14="http://schemas.microsoft.com/office/powerpoint/2010/main" val="4216422739"/>
+        <p14:creationId xmlns:p14="http://schemas.microsoft.com/office/powerpoint/2010/main" xmlns="" val="4216422739"/>
       </p:ext>
     </p:extLst>
   </p:cSld>
@@ -5860,7 +5963,7 @@
         </p:nvSpPr>
         <p:spPr bwMode="auto">
           <a:xfrm>
-            <a:off x="8633677" y="2259324"/>
+            <a:off x="8633677" y="2259325"/>
             <a:ext cx="180000" cy="487363"/>
           </a:xfrm>
           <a:prstGeom prst="roundRect">
@@ -5903,7 +6006,7 @@
         </p:nvSpPr>
         <p:spPr>
           <a:xfrm>
-            <a:off x="8553577" y="2346914"/>
+            <a:off x="8553577" y="2346916"/>
             <a:ext cx="409614" cy="307777"/>
           </a:xfrm>
           <a:prstGeom prst="rect">
@@ -5945,7 +6048,7 @@
         </p:blipFill>
         <p:spPr>
           <a:xfrm>
-            <a:off x="782540" y="1338619"/>
+            <a:off x="782540" y="1338620"/>
             <a:ext cx="7578920" cy="4538667"/>
           </a:xfrm>
           <a:prstGeom prst="rect">
@@ -5956,7 +6059,7 @@
     </p:spTree>
     <p:extLst>
       <p:ext uri="{BB962C8B-B14F-4D97-AF65-F5344CB8AC3E}">
-        <p14:creationId xmlns:p14="http://schemas.microsoft.com/office/powerpoint/2010/main" val="1466112408"/>
+        <p14:creationId xmlns:p14="http://schemas.microsoft.com/office/powerpoint/2010/main" xmlns="" val="1466112408"/>
       </p:ext>
     </p:extLst>
   </p:cSld>
@@ -6051,7 +6154,7 @@
         </p:nvSpPr>
         <p:spPr bwMode="auto">
           <a:xfrm>
-            <a:off x="8633677" y="2259324"/>
+            <a:off x="8633677" y="2259325"/>
             <a:ext cx="180000" cy="487363"/>
           </a:xfrm>
           <a:prstGeom prst="roundRect">
@@ -6094,7 +6197,7 @@
         </p:nvSpPr>
         <p:spPr>
           <a:xfrm>
-            <a:off x="8553577" y="2346914"/>
+            <a:off x="8553577" y="2346916"/>
             <a:ext cx="409614" cy="307777"/>
           </a:xfrm>
           <a:prstGeom prst="rect">
@@ -6136,7 +6239,7 @@
         </p:blipFill>
         <p:spPr>
           <a:xfrm>
-            <a:off x="1831292" y="1268760"/>
+            <a:off x="1831292" y="1268762"/>
             <a:ext cx="5909060" cy="4657551"/>
           </a:xfrm>
           <a:prstGeom prst="rect">
@@ -6147,7 +6250,7 @@
     </p:spTree>
     <p:extLst>
       <p:ext uri="{BB962C8B-B14F-4D97-AF65-F5344CB8AC3E}">
-        <p14:creationId xmlns:p14="http://schemas.microsoft.com/office/powerpoint/2010/main" val="2650412750"/>
+        <p14:creationId xmlns:p14="http://schemas.microsoft.com/office/powerpoint/2010/main" xmlns="" val="2650412750"/>
       </p:ext>
     </p:extLst>
   </p:cSld>
@@ -6208,7 +6311,7 @@
         </p:nvSpPr>
         <p:spPr>
           <a:xfrm>
-            <a:off x="738202" y="1401763"/>
+            <a:off x="738204" y="1401763"/>
             <a:ext cx="7342187" cy="3262432"/>
           </a:xfrm>
         </p:spPr>
@@ -6301,7 +6404,7 @@
     </p:spTree>
     <p:extLst>
       <p:ext uri="{BB962C8B-B14F-4D97-AF65-F5344CB8AC3E}">
-        <p14:creationId xmlns:p14="http://schemas.microsoft.com/office/powerpoint/2010/main" val="636071355"/>
+        <p14:creationId xmlns:p14="http://schemas.microsoft.com/office/powerpoint/2010/main" xmlns="" val="636071355"/>
       </p:ext>
     </p:extLst>
   </p:cSld>
@@ -6337,7 +6440,7 @@
         </p:nvSpPr>
         <p:spPr bwMode="auto">
           <a:xfrm>
-            <a:off x="565632" y="4896300"/>
+            <a:off x="565632" y="4896301"/>
             <a:ext cx="8085762" cy="862481"/>
           </a:xfrm>
           <a:prstGeom prst="rect">
@@ -6453,7 +6556,7 @@
         </p:nvSpPr>
         <p:spPr bwMode="auto">
           <a:xfrm>
-            <a:off x="8634974" y="2806783"/>
+            <a:off x="8634974" y="2806784"/>
             <a:ext cx="180000" cy="487363"/>
           </a:xfrm>
           <a:prstGeom prst="roundRect">
@@ -6496,7 +6599,7 @@
         </p:nvSpPr>
         <p:spPr>
           <a:xfrm>
-            <a:off x="8580569" y="2894373"/>
+            <a:off x="8580569" y="2894374"/>
             <a:ext cx="409614" cy="307777"/>
           </a:xfrm>
           <a:prstGeom prst="rect">
@@ -6538,7 +6641,7 @@
         </p:blipFill>
         <p:spPr>
           <a:xfrm>
-            <a:off x="2042413" y="1318872"/>
+            <a:off x="2042415" y="1318872"/>
             <a:ext cx="5059201" cy="4558400"/>
           </a:xfrm>
           <a:prstGeom prst="rect">
@@ -6549,7 +6652,7 @@
     </p:spTree>
     <p:extLst>
       <p:ext uri="{BB962C8B-B14F-4D97-AF65-F5344CB8AC3E}">
-        <p14:creationId xmlns:p14="http://schemas.microsoft.com/office/powerpoint/2010/main" val="2630595883"/>
+        <p14:creationId xmlns:p14="http://schemas.microsoft.com/office/powerpoint/2010/main" xmlns="" val="2630595883"/>
       </p:ext>
     </p:extLst>
   </p:cSld>
@@ -6667,7 +6770,7 @@
         </p:nvSpPr>
         <p:spPr>
           <a:xfrm>
-            <a:off x="738202" y="1401763"/>
+            <a:off x="738204" y="1401763"/>
             <a:ext cx="7342187" cy="4832092"/>
           </a:xfrm>
         </p:spPr>
@@ -6691,7 +6794,7 @@
               <a:defRPr/>
             </a:pPr>
             <a:r>
-              <a:rPr lang="de-DE" b="1" dirty="0">
+              <a:rPr lang="de-DE" b="1" dirty="0" smtClean="0">
                 <a:solidFill>
                   <a:schemeClr val="accent4">
                     <a:lumMod val="65000"/>
@@ -6699,8 +6802,16 @@
                   </a:schemeClr>
                 </a:solidFill>
               </a:rPr>
-              <a:t>Einleitung</a:t>
-            </a:r>
+              <a:t>Vorgehensweise und Features</a:t>
+            </a:r>
+            <a:endParaRPr lang="de-DE" b="1" dirty="0">
+              <a:solidFill>
+                <a:schemeClr val="accent4">
+                  <a:lumMod val="65000"/>
+                  <a:lumOff val="35000"/>
+                </a:schemeClr>
+              </a:solidFill>
+            </a:endParaRPr>
           </a:p>
           <a:p>
             <a:pPr marL="1160463" indent="-1160463">
@@ -6966,7 +7077,7 @@
         </p:nvSpPr>
         <p:spPr>
           <a:xfrm>
-            <a:off x="8607593" y="703745"/>
+            <a:off x="8607593" y="703746"/>
             <a:ext cx="237930" cy="307777"/>
           </a:xfrm>
           <a:prstGeom prst="rect">
@@ -6995,7 +7106,7 @@
     </p:spTree>
     <p:extLst>
       <p:ext uri="{BB962C8B-B14F-4D97-AF65-F5344CB8AC3E}">
-        <p14:creationId xmlns:p14="http://schemas.microsoft.com/office/powerpoint/2010/main" val="309100733"/>
+        <p14:creationId xmlns:p14="http://schemas.microsoft.com/office/powerpoint/2010/main" xmlns="" val="309100733"/>
       </p:ext>
     </p:extLst>
   </p:cSld>
@@ -7113,7 +7224,7 @@
         </p:nvSpPr>
         <p:spPr>
           <a:xfrm>
-            <a:off x="738202" y="1401763"/>
+            <a:off x="738204" y="1401763"/>
             <a:ext cx="7342187" cy="4832092"/>
           </a:xfrm>
         </p:spPr>
@@ -7137,7 +7248,7 @@
               <a:defRPr/>
             </a:pPr>
             <a:r>
-              <a:rPr lang="de-DE" dirty="0">
+              <a:rPr lang="de-DE" dirty="0" smtClean="0">
                 <a:solidFill>
                   <a:schemeClr val="accent4">
                     <a:lumMod val="65000"/>
@@ -7145,8 +7256,27 @@
                   </a:schemeClr>
                 </a:solidFill>
               </a:rPr>
-              <a:t>Einleitung</a:t>
-            </a:r>
+              <a:t>Vorgehensweise und </a:t>
+            </a:r>
+            <a:r>
+              <a:rPr lang="de-DE" dirty="0" smtClean="0">
+                <a:solidFill>
+                  <a:schemeClr val="accent4">
+                    <a:lumMod val="65000"/>
+                    <a:lumOff val="35000"/>
+                  </a:schemeClr>
+                </a:solidFill>
+              </a:rPr>
+              <a:t>Features</a:t>
+            </a:r>
+            <a:endParaRPr lang="de-DE" dirty="0">
+              <a:solidFill>
+                <a:schemeClr val="accent4">
+                  <a:lumMod val="65000"/>
+                  <a:lumOff val="35000"/>
+                </a:schemeClr>
+              </a:solidFill>
+            </a:endParaRPr>
           </a:p>
           <a:p>
             <a:pPr marL="1160463" indent="-1160463">
@@ -7364,7 +7494,7 @@
         </p:nvSpPr>
         <p:spPr bwMode="auto">
           <a:xfrm>
-            <a:off x="8645011" y="3349836"/>
+            <a:off x="8645011" y="3349837"/>
             <a:ext cx="180000" cy="487363"/>
           </a:xfrm>
           <a:prstGeom prst="roundRect">
@@ -7407,7 +7537,7 @@
         </p:nvSpPr>
         <p:spPr>
           <a:xfrm>
-            <a:off x="8559942" y="3437426"/>
+            <a:off x="8559942" y="3437428"/>
             <a:ext cx="409614" cy="307777"/>
           </a:xfrm>
           <a:prstGeom prst="rect">
@@ -7436,7 +7566,7 @@
     </p:spTree>
     <p:extLst>
       <p:ext uri="{BB962C8B-B14F-4D97-AF65-F5344CB8AC3E}">
-        <p14:creationId xmlns:p14="http://schemas.microsoft.com/office/powerpoint/2010/main" val="1550742323"/>
+        <p14:creationId xmlns:p14="http://schemas.microsoft.com/office/powerpoint/2010/main" xmlns="" val="1550742323"/>
       </p:ext>
     </p:extLst>
   </p:cSld>
@@ -7526,7 +7656,7 @@
         </p:nvSpPr>
         <p:spPr bwMode="auto">
           <a:xfrm>
-            <a:off x="8645011" y="3349836"/>
+            <a:off x="8645011" y="3349837"/>
             <a:ext cx="180000" cy="487363"/>
           </a:xfrm>
           <a:prstGeom prst="roundRect">
@@ -7569,7 +7699,7 @@
         </p:nvSpPr>
         <p:spPr>
           <a:xfrm>
-            <a:off x="8559942" y="3437426"/>
+            <a:off x="8559942" y="3437428"/>
             <a:ext cx="409614" cy="307777"/>
           </a:xfrm>
           <a:prstGeom prst="rect">
@@ -7607,7 +7737,7 @@
         </p:nvSpPr>
         <p:spPr>
           <a:xfrm>
-            <a:off x="738202" y="1401777"/>
+            <a:off x="738204" y="1401778"/>
             <a:ext cx="7342187" cy="3631763"/>
           </a:xfrm>
         </p:spPr>
@@ -7682,7 +7812,7 @@
     </p:spTree>
     <p:extLst>
       <p:ext uri="{BB962C8B-B14F-4D97-AF65-F5344CB8AC3E}">
-        <p14:creationId xmlns:p14="http://schemas.microsoft.com/office/powerpoint/2010/main" val="76012745"/>
+        <p14:creationId xmlns:p14="http://schemas.microsoft.com/office/powerpoint/2010/main" xmlns="" val="76012745"/>
       </p:ext>
     </p:extLst>
   </p:cSld>
@@ -7743,7 +7873,7 @@
         </p:nvSpPr>
         <p:spPr>
           <a:xfrm>
-            <a:off x="738202" y="1401777"/>
+            <a:off x="738204" y="1401778"/>
             <a:ext cx="7342187" cy="307777"/>
           </a:xfrm>
         </p:spPr>
@@ -7797,7 +7927,7 @@
         </p:nvSpPr>
         <p:spPr bwMode="auto">
           <a:xfrm>
-            <a:off x="8645011" y="3349836"/>
+            <a:off x="8645011" y="3349837"/>
             <a:ext cx="180000" cy="487363"/>
           </a:xfrm>
           <a:prstGeom prst="roundRect">
@@ -7840,7 +7970,7 @@
         </p:nvSpPr>
         <p:spPr>
           <a:xfrm>
-            <a:off x="8559942" y="3437426"/>
+            <a:off x="8559942" y="3437428"/>
             <a:ext cx="409614" cy="307777"/>
           </a:xfrm>
           <a:prstGeom prst="rect">
@@ -7869,7 +7999,7 @@
     </p:spTree>
     <p:extLst>
       <p:ext uri="{BB962C8B-B14F-4D97-AF65-F5344CB8AC3E}">
-        <p14:creationId xmlns:p14="http://schemas.microsoft.com/office/powerpoint/2010/main" val="3606055436"/>
+        <p14:creationId xmlns:p14="http://schemas.microsoft.com/office/powerpoint/2010/main" xmlns="" val="3606055436"/>
       </p:ext>
     </p:extLst>
   </p:cSld>
@@ -7907,7 +8037,7 @@
         <p:spPr bwMode="auto">
           <a:xfrm>
             <a:off x="365727" y="753011"/>
-            <a:ext cx="8229600" cy="2758918"/>
+            <a:ext cx="8229600" cy="2758919"/>
           </a:xfrm>
           <a:prstGeom prst="rect">
             <a:avLst/>
@@ -7987,8 +8117,8 @@
         </p:nvSpPr>
         <p:spPr bwMode="auto">
           <a:xfrm>
-            <a:off x="553027" y="3740710"/>
-            <a:ext cx="8229600" cy="1269130"/>
+            <a:off x="553027" y="3740709"/>
+            <a:ext cx="8229600" cy="1269131"/>
           </a:xfrm>
           <a:prstGeom prst="rect">
             <a:avLst/>
@@ -8034,8 +8164,8 @@
         </p:blipFill>
         <p:spPr bwMode="auto">
           <a:xfrm>
-            <a:off x="755590" y="5373216"/>
-            <a:ext cx="2428875" cy="390526"/>
+            <a:off x="755592" y="5373217"/>
+            <a:ext cx="2428875" cy="390527"/>
           </a:xfrm>
           <a:prstGeom prst="rect">
             <a:avLst/>
@@ -8053,8 +8183,8 @@
         </p:nvSpPr>
         <p:spPr bwMode="auto">
           <a:xfrm>
-            <a:off x="637187" y="3742982"/>
-            <a:ext cx="7974552" cy="1269130"/>
+            <a:off x="637187" y="3742981"/>
+            <a:ext cx="7974552" cy="1269131"/>
           </a:xfrm>
           <a:prstGeom prst="rect">
             <a:avLst/>
@@ -8094,7 +8224,7 @@
         </p:nvSpPr>
         <p:spPr>
           <a:xfrm>
-            <a:off x="457214" y="3933056"/>
+            <a:off x="457216" y="3933056"/>
             <a:ext cx="8229599" cy="471026"/>
           </a:xfrm>
           <a:prstGeom prst="rect">
@@ -8143,7 +8273,7 @@
         </p:blipFill>
         <p:spPr>
           <a:xfrm>
-            <a:off x="7668344" y="5315845"/>
+            <a:off x="7668344" y="5315846"/>
             <a:ext cx="808562" cy="543876"/>
           </a:xfrm>
           <a:prstGeom prst="rect">
@@ -8154,7 +8284,7 @@
     </p:spTree>
     <p:extLst>
       <p:ext uri="{BB962C8B-B14F-4D97-AF65-F5344CB8AC3E}">
-        <p14:creationId xmlns:p14="http://schemas.microsoft.com/office/powerpoint/2010/main" val="1684480284"/>
+        <p14:creationId xmlns:p14="http://schemas.microsoft.com/office/powerpoint/2010/main" xmlns="" val="1684480284"/>
       </p:ext>
     </p:extLst>
   </p:cSld>
@@ -8198,9 +8328,10 @@
           <a:lstStyle/>
           <a:p>
             <a:r>
-              <a:rPr lang="de-DE" dirty="0"/>
-              <a:t>Einleitung</a:t>
-            </a:r>
+              <a:rPr lang="de-DE" dirty="0" smtClean="0"/>
+              <a:t>Vorgehensweise  bei der Entwicklung</a:t>
+            </a:r>
+            <a:endParaRPr lang="de-DE" dirty="0"/>
           </a:p>
         </p:txBody>
       </p:sp>
@@ -8285,7 +8416,7 @@
         </p:nvSpPr>
         <p:spPr>
           <a:xfrm>
-            <a:off x="8607593" y="703745"/>
+            <a:off x="8607593" y="703746"/>
             <a:ext cx="237930" cy="307777"/>
           </a:xfrm>
           <a:prstGeom prst="rect">
@@ -8323,8 +8454,8 @@
         </p:nvSpPr>
         <p:spPr>
           <a:xfrm>
-            <a:off x="738202" y="1401777"/>
-            <a:ext cx="7342187" cy="4555093"/>
+            <a:off x="738204" y="1401778"/>
+            <a:ext cx="7342187" cy="3139321"/>
           </a:xfrm>
         </p:spPr>
         <p:txBody>
@@ -8332,78 +8463,204 @@
           <a:lstStyle/>
           <a:p>
             <a:r>
+              <a:rPr lang="de-DE" dirty="0" smtClean="0"/>
+              <a:t>Konzeptentwicklung in </a:t>
+            </a:r>
+            <a:r>
+              <a:rPr lang="de-DE" dirty="0" smtClean="0"/>
+              <a:t>UML</a:t>
+            </a:r>
+          </a:p>
+          <a:p>
+            <a:pPr lvl="1"/>
+            <a:r>
+              <a:rPr lang="de-DE" dirty="0" smtClean="0"/>
+              <a:t>Arbeitsaufteilung nach </a:t>
+            </a:r>
+            <a:r>
+              <a:rPr lang="de-DE" dirty="0" smtClean="0"/>
+              <a:t>Klassen und </a:t>
+            </a:r>
+            <a:r>
+              <a:rPr lang="de-DE" dirty="0" smtClean="0"/>
+              <a:t>Festlegen der </a:t>
+            </a:r>
+            <a:r>
+              <a:rPr lang="de-DE" dirty="0" smtClean="0"/>
+              <a:t>Schnittstellen</a:t>
+            </a:r>
+            <a:endParaRPr lang="de-DE" dirty="0" smtClean="0"/>
+          </a:p>
+          <a:p>
+            <a:pPr lvl="1"/>
+            <a:r>
+              <a:rPr lang="de-DE" dirty="0" smtClean="0"/>
+              <a:t>Einheitliche Definition wichtiger Methoden- und Variablennamen</a:t>
+            </a:r>
+          </a:p>
+          <a:p>
+            <a:r>
+              <a:rPr lang="de-DE" dirty="0" smtClean="0"/>
+              <a:t>Einsatz der Programmiersprache C++ in der</a:t>
+            </a:r>
+            <a:br>
+              <a:rPr lang="de-DE" dirty="0" smtClean="0"/>
+            </a:br>
+            <a:r>
+              <a:rPr lang="de-DE" dirty="0" smtClean="0"/>
+              <a:t>Entwicklungsumgebung Code::Blocks</a:t>
+            </a:r>
+          </a:p>
+          <a:p>
+            <a:r>
+              <a:rPr lang="de-DE" dirty="0" smtClean="0"/>
+              <a:t>Gemeinsame Verwendung des Version </a:t>
+            </a:r>
+            <a:r>
+              <a:rPr lang="de-DE" dirty="0" err="1" smtClean="0"/>
+              <a:t>Control</a:t>
+            </a:r>
+            <a:r>
+              <a:rPr lang="de-DE" dirty="0" smtClean="0"/>
+              <a:t> </a:t>
+            </a:r>
+            <a:r>
+              <a:rPr lang="de-DE" dirty="0" smtClean="0"/>
+              <a:t>Systems </a:t>
+            </a:r>
+            <a:r>
+              <a:rPr lang="de-DE" dirty="0" err="1" smtClean="0"/>
+              <a:t>Git</a:t>
+            </a:r>
+            <a:endParaRPr lang="de-DE" dirty="0" smtClean="0"/>
+          </a:p>
+          <a:p>
+            <a:r>
+              <a:rPr lang="de-DE" dirty="0" smtClean="0"/>
+              <a:t>Automatische Dokumentation der Software mit </a:t>
+            </a:r>
+            <a:r>
+              <a:rPr lang="de-DE" dirty="0" err="1" smtClean="0"/>
+              <a:t>Doxygen</a:t>
+            </a:r>
+            <a:endParaRPr lang="de-DE" dirty="0" smtClean="0"/>
+          </a:p>
+          <a:p>
+            <a:r>
+              <a:rPr lang="de-DE" dirty="0" smtClean="0"/>
+              <a:t>Ziele</a:t>
+            </a:r>
+            <a:r>
               <a:rPr lang="de-DE" dirty="0"/>
-              <a:t>Allgemeine Fragen an Betreuer:</a:t>
-            </a:r>
-          </a:p>
-          <a:p>
-            <a:r>
-              <a:rPr lang="de-DE" dirty="0"/>
-              <a:t>Muss erläutert werden wie genau Sachen umgesetzt wurden funktioniert, </a:t>
-            </a:r>
-            <a:br>
-              <a:rPr lang="de-DE" dirty="0"/>
-            </a:br>
-            <a:r>
-              <a:rPr lang="de-DE" dirty="0"/>
-              <a:t>Stichpunkt: Modus 1 und 2 und Zurücksetzen des Counters</a:t>
-            </a:r>
-            <a:br>
-              <a:rPr lang="de-DE" dirty="0"/>
-            </a:br>
-            <a:r>
-              <a:rPr lang="de-DE" dirty="0"/>
-              <a:t>…</a:t>
-            </a:r>
-          </a:p>
-          <a:p>
-            <a:endParaRPr lang="de-DE" dirty="0"/>
-          </a:p>
-          <a:p>
-            <a:r>
-              <a:rPr lang="de-DE" dirty="0"/>
-              <a:t>Konzeptentwicklung in UML</a:t>
-            </a:r>
-          </a:p>
-          <a:p>
-            <a:pPr lvl="1"/>
-            <a:r>
-              <a:rPr lang="de-DE" dirty="0"/>
-              <a:t>Arbeitsaufteilung nach Klassen</a:t>
-            </a:r>
-          </a:p>
-          <a:p>
-            <a:pPr lvl="1"/>
-            <a:endParaRPr lang="de-DE" dirty="0"/>
-          </a:p>
-          <a:p>
-            <a:r>
-              <a:rPr lang="de-DE" dirty="0"/>
-              <a:t>Dokumentation</a:t>
-            </a:r>
-          </a:p>
-          <a:p>
-            <a:endParaRPr lang="de-DE" dirty="0"/>
-          </a:p>
-          <a:p>
-            <a:r>
-              <a:rPr lang="de-DE" dirty="0"/>
-              <a:t>Ziele: Einfacher, verständlicher Code</a:t>
-            </a:r>
-          </a:p>
-          <a:p>
-            <a:pPr lvl="1"/>
-            <a:r>
-              <a:rPr lang="de-DE" dirty="0"/>
-              <a:t>Einzelne Funktionen übernehmen nur eine kleine Aufgabe</a:t>
-            </a:r>
-          </a:p>
-        </p:txBody>
-      </p:sp>
+              <a:t>: Einfacher, verständlicher </a:t>
+            </a:r>
+            <a:r>
+              <a:rPr lang="de-DE" dirty="0" smtClean="0"/>
+              <a:t>Code</a:t>
+            </a:r>
+          </a:p>
+        </p:txBody>
+      </p:sp>
+      <p:pic>
+        <p:nvPicPr>
+          <p:cNvPr id="8" name="Grafik 7" descr="StarUML_logo.png"/>
+          <p:cNvPicPr>
+            <a:picLocks noChangeAspect="1"/>
+          </p:cNvPicPr>
+          <p:nvPr/>
+        </p:nvPicPr>
+        <p:blipFill>
+          <a:blip r:embed="rId2"/>
+          <a:stretch>
+            <a:fillRect/>
+          </a:stretch>
+        </p:blipFill>
+        <p:spPr>
+          <a:xfrm>
+            <a:off x="722313" y="4848550"/>
+            <a:ext cx="800877" cy="762434"/>
+          </a:xfrm>
+          <a:prstGeom prst="rect">
+            <a:avLst/>
+          </a:prstGeom>
+        </p:spPr>
+      </p:pic>
+      <p:pic>
+        <p:nvPicPr>
+          <p:cNvPr id="9" name="Grafik 8" descr="git_logo.png"/>
+          <p:cNvPicPr>
+            <a:picLocks noChangeAspect="1"/>
+          </p:cNvPicPr>
+          <p:nvPr/>
+        </p:nvPicPr>
+        <p:blipFill>
+          <a:blip r:embed="rId3"/>
+          <a:stretch>
+            <a:fillRect/>
+          </a:stretch>
+        </p:blipFill>
+        <p:spPr>
+          <a:xfrm>
+            <a:off x="3417954" y="4963365"/>
+            <a:ext cx="1584176" cy="662474"/>
+          </a:xfrm>
+          <a:prstGeom prst="rect">
+            <a:avLst/>
+          </a:prstGeom>
+        </p:spPr>
+      </p:pic>
+      <p:pic>
+        <p:nvPicPr>
+          <p:cNvPr id="10" name="Grafik 9" descr="doxygen_logo.png"/>
+          <p:cNvPicPr>
+            <a:picLocks noChangeAspect="1"/>
+          </p:cNvPicPr>
+          <p:nvPr/>
+        </p:nvPicPr>
+        <p:blipFill>
+          <a:blip r:embed="rId4"/>
+          <a:stretch>
+            <a:fillRect/>
+          </a:stretch>
+        </p:blipFill>
+        <p:spPr>
+          <a:xfrm>
+            <a:off x="5293307" y="4963365"/>
+            <a:ext cx="3314286" cy="647619"/>
+          </a:xfrm>
+          <a:prstGeom prst="rect">
+            <a:avLst/>
+          </a:prstGeom>
+        </p:spPr>
+      </p:pic>
+      <p:pic>
+        <p:nvPicPr>
+          <p:cNvPr id="11" name="Grafik 10" descr="Codeblocks_logo.png"/>
+          <p:cNvPicPr>
+            <a:picLocks noChangeAspect="1"/>
+          </p:cNvPicPr>
+          <p:nvPr/>
+        </p:nvPicPr>
+        <p:blipFill>
+          <a:blip r:embed="rId5"/>
+          <a:stretch>
+            <a:fillRect/>
+          </a:stretch>
+        </p:blipFill>
+        <p:spPr>
+          <a:xfrm>
+            <a:off x="2123728" y="4848550"/>
+            <a:ext cx="812698" cy="812698"/>
+          </a:xfrm>
+          <a:prstGeom prst="rect">
+            <a:avLst/>
+          </a:prstGeom>
+        </p:spPr>
+      </p:pic>
     </p:spTree>
     <p:extLst>
       <p:ext uri="{BB962C8B-B14F-4D97-AF65-F5344CB8AC3E}">
-        <p14:creationId xmlns:p14="http://schemas.microsoft.com/office/powerpoint/2010/main" val="4221714953"/>
+        <p14:creationId xmlns:p14="http://schemas.microsoft.com/office/powerpoint/2010/main" xmlns="" val="4221714953"/>
       </p:ext>
     </p:extLst>
   </p:cSld>
@@ -8446,15 +8703,16 @@
           <a:lstStyle/>
           <a:p>
             <a:r>
-              <a:rPr lang="de-DE" dirty="0"/>
-              <a:t>Features</a:t>
-            </a:r>
-          </a:p>
-        </p:txBody>
-      </p:sp>
-      <p:sp>
-        <p:nvSpPr>
-          <p:cNvPr id="3" name="Inhaltsplatzhalter 2"/>
+              <a:rPr lang="de-DE" dirty="0" smtClean="0"/>
+              <a:t>Features der Software</a:t>
+            </a:r>
+            <a:endParaRPr lang="de-DE" dirty="0"/>
+          </a:p>
+        </p:txBody>
+      </p:sp>
+      <p:sp>
+        <p:nvSpPr>
+          <p:cNvPr id="7" name="Inhaltsplatzhalter 6"/>
           <p:cNvSpPr>
             <a:spLocks noGrp="1"/>
           </p:cNvSpPr>
@@ -8464,7 +8722,7 @@
         </p:nvSpPr>
         <p:spPr>
           <a:xfrm>
-            <a:off x="738202" y="1401763"/>
+            <a:off x="738197" y="1401763"/>
             <a:ext cx="7342187" cy="2893100"/>
           </a:xfrm>
         </p:spPr>
@@ -8472,57 +8730,103 @@
           <a:bodyPr/>
           <a:lstStyle/>
           <a:p>
-            <a:r>
-              <a:rPr lang="de-DE" dirty="0"/>
+            <a:pPr lvl="0"/>
+            <a:r>
+              <a:rPr lang="de-DE" dirty="0" smtClean="0">
+                <a:cs typeface="Calibri" pitchFamily="34" charset="0"/>
+              </a:rPr>
               <a:t>Intelligent: Abarbeitung der Aufrufe nach Fahrtrichtung</a:t>
             </a:r>
           </a:p>
           <a:p>
-            <a:r>
-              <a:rPr lang="de-DE" dirty="0"/>
+            <a:pPr lvl="0"/>
+            <a:r>
+              <a:rPr lang="de-DE" dirty="0" smtClean="0">
+                <a:cs typeface="Calibri" pitchFamily="34" charset="0"/>
+              </a:rPr>
               <a:t>Komfortabel: sanftes Anfahren und Abbremsen</a:t>
             </a:r>
           </a:p>
           <a:p>
-            <a:r>
-              <a:rPr lang="de-DE" dirty="0"/>
+            <a:pPr lvl="0"/>
+            <a:r>
+              <a:rPr lang="de-DE" dirty="0" smtClean="0">
+                <a:cs typeface="Calibri" pitchFamily="34" charset="0"/>
+              </a:rPr>
               <a:t>Anpassbar: Einfache Erweiterung mit weiteren Etagen</a:t>
             </a:r>
           </a:p>
           <a:p>
-            <a:r>
-              <a:rPr lang="de-DE" dirty="0"/>
+            <a:pPr lvl="0"/>
+            <a:r>
+              <a:rPr lang="de-DE" dirty="0" smtClean="0">
+                <a:cs typeface="Calibri" pitchFamily="34" charset="0"/>
+              </a:rPr>
               <a:t>Sicher: Überwachung der Türen </a:t>
             </a:r>
           </a:p>
           <a:p>
-            <a:r>
-              <a:rPr lang="de-DE" dirty="0"/>
+            <a:pPr lvl="0"/>
+            <a:r>
+              <a:rPr lang="de-DE" dirty="0" smtClean="0">
+                <a:cs typeface="Calibri" pitchFamily="34" charset="0"/>
+              </a:rPr>
               <a:t>Ausfallgesichert: Starten aus jeder Position möglich</a:t>
             </a:r>
           </a:p>
           <a:p>
-            <a:r>
-              <a:rPr lang="de-DE" dirty="0"/>
-              <a:t>Fehlerfrei: keine Fehlfunktionen </a:t>
-            </a:r>
-          </a:p>
-          <a:p>
-            <a:r>
-              <a:rPr lang="de-DE" dirty="0"/>
-              <a:t>Dokumentation: Dokumentierung mittels </a:t>
-            </a:r>
-            <a:r>
-              <a:rPr lang="de-DE" dirty="0" err="1"/>
-              <a:t>DoxDingens</a:t>
-            </a:r>
+            <a:pPr lvl="0"/>
+            <a:r>
+              <a:rPr lang="de-DE" dirty="0" smtClean="0">
+                <a:cs typeface="Calibri" pitchFamily="34" charset="0"/>
+              </a:rPr>
+              <a:t>Fehlerfrei: keine Fehlfunktionen</a:t>
+            </a:r>
+          </a:p>
+          <a:p>
+            <a:pPr lvl="0"/>
+            <a:r>
+              <a:rPr lang="de-DE" dirty="0" smtClean="0">
+                <a:cs typeface="Calibri" pitchFamily="34" charset="0"/>
+              </a:rPr>
+              <a:t>Clean: </a:t>
+            </a:r>
+            <a:r>
+              <a:rPr lang="de-DE" dirty="0" smtClean="0">
+                <a:cs typeface="Calibri" pitchFamily="34" charset="0"/>
+              </a:rPr>
+              <a:t>Verwendung </a:t>
+            </a:r>
+            <a:r>
+              <a:rPr lang="de-DE" dirty="0" smtClean="0">
+                <a:cs typeface="Calibri" pitchFamily="34" charset="0"/>
+              </a:rPr>
+              <a:t>sprechender </a:t>
+            </a:r>
+            <a:r>
+              <a:rPr lang="de-DE" dirty="0" smtClean="0">
+                <a:cs typeface="Calibri" pitchFamily="34" charset="0"/>
+              </a:rPr>
+              <a:t>Methoden- </a:t>
+            </a:r>
+            <a:r>
+              <a:rPr lang="de-DE" dirty="0" smtClean="0">
+                <a:cs typeface="Calibri" pitchFamily="34" charset="0"/>
+              </a:rPr>
+              <a:t>und </a:t>
+            </a:r>
+            <a:r>
+              <a:rPr lang="de-DE" dirty="0" smtClean="0">
+                <a:cs typeface="Calibri" pitchFamily="34" charset="0"/>
+              </a:rPr>
+              <a:t>Variablennamen</a:t>
+            </a:r>
+            <a:endParaRPr lang="de-DE" dirty="0" smtClean="0">
+              <a:cs typeface="Calibri" pitchFamily="34" charset="0"/>
+            </a:endParaRPr>
+          </a:p>
+          <a:p>
             <a:endParaRPr lang="de-DE" dirty="0"/>
-          </a:p>
-          <a:p>
-            <a:r>
-              <a:rPr lang="de-DE" dirty="0"/>
-              <a:t>Clean: …</a:t>
-            </a:r>
           </a:p>
         </p:txBody>
       </p:sp>
@@ -8558,7 +8862,7 @@
     </p:spTree>
     <p:extLst>
       <p:ext uri="{BB962C8B-B14F-4D97-AF65-F5344CB8AC3E}">
-        <p14:creationId xmlns:p14="http://schemas.microsoft.com/office/powerpoint/2010/main" val="1893387264"/>
+        <p14:creationId xmlns:p14="http://schemas.microsoft.com/office/powerpoint/2010/main" xmlns="" val="1893387264"/>
       </p:ext>
     </p:extLst>
   </p:cSld>
@@ -8676,7 +8980,7 @@
         </p:nvSpPr>
         <p:spPr>
           <a:xfrm>
-            <a:off x="738202" y="1401763"/>
+            <a:off x="738204" y="1401763"/>
             <a:ext cx="7342187" cy="4462760"/>
           </a:xfrm>
         </p:spPr>
@@ -8700,7 +9004,7 @@
               <a:defRPr/>
             </a:pPr>
             <a:r>
-              <a:rPr lang="de-DE" dirty="0">
+              <a:rPr lang="de-DE" dirty="0" smtClean="0">
                 <a:solidFill>
                   <a:schemeClr val="accent4">
                     <a:lumMod val="65000"/>
@@ -8708,7 +9012,7 @@
                   </a:schemeClr>
                 </a:solidFill>
               </a:rPr>
-              <a:t>Einleitung</a:t>
+              <a:t>Vorgehensweise und Features</a:t>
             </a:r>
           </a:p>
           <a:p>
@@ -8728,6 +9032,17 @@
               <a:defRPr/>
             </a:pPr>
             <a:r>
+              <a:rPr lang="de-DE" b="1" dirty="0" smtClean="0">
+                <a:solidFill>
+                  <a:schemeClr val="accent4">
+                    <a:lumMod val="65000"/>
+                    <a:lumOff val="35000"/>
+                  </a:schemeClr>
+                </a:solidFill>
+              </a:rPr>
+              <a:t>Klassenübersicht </a:t>
+            </a:r>
+            <a:r>
               <a:rPr lang="de-DE" b="1" dirty="0">
                 <a:solidFill>
                   <a:schemeClr val="accent4">
@@ -8736,7 +9051,7 @@
                   </a:schemeClr>
                 </a:solidFill>
               </a:rPr>
-              <a:t>Klassenübersicht &amp; </a:t>
+              <a:t>&amp; </a:t>
             </a:r>
             <a:r>
               <a:rPr lang="de-DE" b="1" dirty="0" err="1">
@@ -8967,7 +9282,7 @@
         </p:nvSpPr>
         <p:spPr>
           <a:xfrm>
-            <a:off x="8582542" y="1253603"/>
+            <a:off x="8582542" y="1253605"/>
             <a:ext cx="309938" cy="307777"/>
           </a:xfrm>
           <a:prstGeom prst="rect">
@@ -8996,7 +9311,7 @@
     </p:spTree>
     <p:extLst>
       <p:ext uri="{BB962C8B-B14F-4D97-AF65-F5344CB8AC3E}">
-        <p14:creationId xmlns:p14="http://schemas.microsoft.com/office/powerpoint/2010/main" val="3395949267"/>
+        <p14:creationId xmlns:p14="http://schemas.microsoft.com/office/powerpoint/2010/main" xmlns="" val="3395949267"/>
       </p:ext>
     </p:extLst>
   </p:cSld>
@@ -9137,7 +9452,7 @@
         </p:nvSpPr>
         <p:spPr>
           <a:xfrm>
-            <a:off x="8582542" y="1253603"/>
+            <a:off x="8582542" y="1253605"/>
             <a:ext cx="309938" cy="307777"/>
           </a:xfrm>
           <a:prstGeom prst="rect">
@@ -9179,7 +9494,7 @@
         </p:blipFill>
         <p:spPr>
           <a:xfrm>
-            <a:off x="2042413" y="1318872"/>
+            <a:off x="2042415" y="1318872"/>
             <a:ext cx="5059201" cy="4558400"/>
           </a:xfrm>
           <a:prstGeom prst="rect">
@@ -9190,7 +9505,7 @@
     </p:spTree>
     <p:extLst>
       <p:ext uri="{BB962C8B-B14F-4D97-AF65-F5344CB8AC3E}">
-        <p14:creationId xmlns:p14="http://schemas.microsoft.com/office/powerpoint/2010/main" val="3427100782"/>
+        <p14:creationId xmlns:p14="http://schemas.microsoft.com/office/powerpoint/2010/main" xmlns="" val="3427100782"/>
       </p:ext>
     </p:extLst>
   </p:cSld>
@@ -9323,7 +9638,7 @@
         </p:nvSpPr>
         <p:spPr>
           <a:xfrm>
-            <a:off x="8582542" y="1253603"/>
+            <a:off x="8582542" y="1253605"/>
             <a:ext cx="309938" cy="307777"/>
           </a:xfrm>
           <a:prstGeom prst="rect">
@@ -9376,7 +9691,7 @@
     </p:spTree>
     <p:extLst>
       <p:ext uri="{BB962C8B-B14F-4D97-AF65-F5344CB8AC3E}">
-        <p14:creationId xmlns:p14="http://schemas.microsoft.com/office/powerpoint/2010/main" val="1036794897"/>
+        <p14:creationId xmlns:p14="http://schemas.microsoft.com/office/powerpoint/2010/main" xmlns="" val="1036794897"/>
       </p:ext>
     </p:extLst>
   </p:cSld>
@@ -9437,7 +9752,7 @@
         </p:nvSpPr>
         <p:spPr>
           <a:xfrm>
-            <a:off x="738202" y="1401777"/>
+            <a:off x="738204" y="1401778"/>
             <a:ext cx="7342187" cy="4247317"/>
           </a:xfrm>
         </p:spPr>
@@ -9588,7 +9903,7 @@
     </p:spTree>
     <p:extLst>
       <p:ext uri="{BB962C8B-B14F-4D97-AF65-F5344CB8AC3E}">
-        <p14:creationId xmlns:p14="http://schemas.microsoft.com/office/powerpoint/2010/main" val="3266891189"/>
+        <p14:creationId xmlns:p14="http://schemas.microsoft.com/office/powerpoint/2010/main" xmlns="" val="3266891189"/>
       </p:ext>
     </p:extLst>
   </p:cSld>
@@ -9650,7 +9965,7 @@
         </p:nvSpPr>
         <p:spPr>
           <a:xfrm>
-            <a:off x="738202" y="1401763"/>
+            <a:off x="738204" y="1401763"/>
             <a:ext cx="7342187" cy="677108"/>
           </a:xfrm>
         </p:spPr>
@@ -9703,7 +10018,7 @@
     </p:spTree>
     <p:extLst>
       <p:ext uri="{BB962C8B-B14F-4D97-AF65-F5344CB8AC3E}">
-        <p14:creationId xmlns:p14="http://schemas.microsoft.com/office/powerpoint/2010/main" val="3823722845"/>
+        <p14:creationId xmlns:p14="http://schemas.microsoft.com/office/powerpoint/2010/main" xmlns="" val="3823722845"/>
       </p:ext>
     </p:extLst>
   </p:cSld>

</xml_diff>

<commit_message>
- neuer Titel: Entwicklung und Implementierung einer Aufzugssteuerung mittels C++ - kleine Korrekturen
</commit_message>
<xml_diff>
--- a/Präsentation.pptx
+++ b/Präsentation.pptx
@@ -3514,27 +3514,6 @@
           </a:p>
         </p:txBody>
       </p:sp>
-      <p:pic>
-        <p:nvPicPr>
-          <p:cNvPr id="18" name="Grafik 17"/>
-          <p:cNvPicPr/>
-          <p:nvPr userDrawn="1"/>
-        </p:nvPicPr>
-        <p:blipFill rotWithShape="1">
-          <a:blip r:embed="rId12"/>
-          <a:srcRect b="21693"/>
-          <a:stretch/>
-        </p:blipFill>
-        <p:spPr>
-          <a:xfrm>
-            <a:off x="7729374" y="116647"/>
-            <a:ext cx="875083" cy="315789"/>
-          </a:xfrm>
-          <a:prstGeom prst="rect">
-            <a:avLst/>
-          </a:prstGeom>
-        </p:spPr>
-      </p:pic>
       <p:sp>
         <p:nvSpPr>
           <p:cNvPr id="19" name="Text Box 57"/>
@@ -3772,6 +3751,28 @@
           </a:p>
         </p:txBody>
       </p:sp>
+      <p:pic>
+        <p:nvPicPr>
+          <p:cNvPr id="25" name="Grafik 24"/>
+          <p:cNvPicPr/>
+          <p:nvPr userDrawn="1"/>
+        </p:nvPicPr>
+        <p:blipFill>
+          <a:blip r:embed="rId12"/>
+          <a:stretch>
+            <a:fillRect/>
+          </a:stretch>
+        </p:blipFill>
+        <p:spPr>
+          <a:xfrm>
+            <a:off x="7884368" y="44624"/>
+            <a:ext cx="682353" cy="390811"/>
+          </a:xfrm>
+          <a:prstGeom prst="rect">
+            <a:avLst/>
+          </a:prstGeom>
+        </p:spPr>
+      </p:pic>
     </p:spTree>
   </p:cSld>
   <p:clrMap bg1="lt1" tx1="dk1" bg2="lt2" tx2="dk2" accent1="accent1" accent2="accent2" accent3="accent3" accent4="accent4" accent5="accent5" accent6="accent6" hlink="hlink" folHlink="folHlink"/>
@@ -4371,7 +4372,7 @@
         <p:spPr>
           <a:xfrm>
             <a:off x="457216" y="3933056"/>
-            <a:ext cx="8229599" cy="849720"/>
+            <a:ext cx="8229599" cy="816506"/>
           </a:xfrm>
           <a:prstGeom prst="rect">
             <a:avLst/>
@@ -4392,7 +4393,7 @@
               </a:spcAft>
             </a:pPr>
             <a:r>
-              <a:rPr lang="de-DE" sz="2300" dirty="0">
+              <a:rPr lang="de-DE" sz="2200" dirty="0">
                 <a:solidFill>
                   <a:schemeClr val="bg1"/>
                 </a:solidFill>
@@ -4400,10 +4401,43 @@
                 <a:ea typeface="Calibri" panose="020F0502020204030204" pitchFamily="34" charset="0"/>
                 <a:cs typeface="Times New Roman" panose="02020603050405020304" pitchFamily="18" charset="0"/>
               </a:rPr>
-              <a:t>Entwicklung und Umsetzung eines Aufzugsmodell mittels C++</a:t>
+              <a:t>Entwicklung und </a:t>
+            </a:r>
+            <a:r>
+              <a:rPr lang="de-DE" sz="2200" dirty="0" smtClean="0">
+                <a:solidFill>
+                  <a:schemeClr val="bg1"/>
+                </a:solidFill>
+                <a:latin typeface="Calibri" panose="020F0502020204030204" pitchFamily="34" charset="0"/>
+                <a:ea typeface="Calibri" panose="020F0502020204030204" pitchFamily="34" charset="0"/>
+                <a:cs typeface="Times New Roman" panose="02020603050405020304" pitchFamily="18" charset="0"/>
+              </a:rPr>
+              <a:t>Implementierung </a:t>
+            </a:r>
+            <a:r>
+              <a:rPr lang="de-DE" sz="2200" dirty="0" smtClean="0">
+                <a:solidFill>
+                  <a:schemeClr val="bg1"/>
+                </a:solidFill>
+                <a:latin typeface="Calibri" panose="020F0502020204030204" pitchFamily="34" charset="0"/>
+                <a:ea typeface="Calibri" panose="020F0502020204030204" pitchFamily="34" charset="0"/>
+                <a:cs typeface="Times New Roman" panose="02020603050405020304" pitchFamily="18" charset="0"/>
+              </a:rPr>
+              <a:t>einer Aufzugssteuerung </a:t>
+            </a:r>
+            <a:r>
+              <a:rPr lang="de-DE" sz="2200" dirty="0">
+                <a:solidFill>
+                  <a:schemeClr val="bg1"/>
+                </a:solidFill>
+                <a:latin typeface="Calibri" panose="020F0502020204030204" pitchFamily="34" charset="0"/>
+                <a:ea typeface="Calibri" panose="020F0502020204030204" pitchFamily="34" charset="0"/>
+                <a:cs typeface="Times New Roman" panose="02020603050405020304" pitchFamily="18" charset="0"/>
+              </a:rPr>
+              <a:t>mittels C++</a:t>
             </a:r>
             <a:br>
-              <a:rPr lang="de-DE" sz="2300" dirty="0">
+              <a:rPr lang="de-DE" sz="2200" dirty="0">
                 <a:solidFill>
                   <a:schemeClr val="bg1"/>
                 </a:solidFill>
@@ -4413,7 +4447,7 @@
               </a:rPr>
             </a:br>
             <a:r>
-              <a:rPr lang="de-DE" sz="2300" dirty="0">
+              <a:rPr lang="de-DE" sz="2200" dirty="0">
                 <a:solidFill>
                   <a:schemeClr val="bg1"/>
                 </a:solidFill>
@@ -4720,6 +4754,13 @@
   <p:clrMapOvr>
     <a:masterClrMapping/>
   </p:clrMapOvr>
+  <p:timing>
+    <p:tnLst>
+      <p:par>
+        <p:cTn id="1" dur="indefinite" restart="never" nodeType="tmRoot"/>
+      </p:par>
+    </p:tnLst>
+  </p:timing>
 </p:sld>
 </file>
 
@@ -4933,6 +4974,13 @@
   <p:clrMapOvr>
     <a:masterClrMapping/>
   </p:clrMapOvr>
+  <p:timing>
+    <p:tnLst>
+      <p:par>
+        <p:cTn id="1" dur="indefinite" restart="never" nodeType="tmRoot"/>
+      </p:par>
+    </p:tnLst>
+  </p:timing>
 </p:sld>
 </file>
 
@@ -5633,6 +5681,13 @@
   <p:clrMapOvr>
     <a:masterClrMapping/>
   </p:clrMapOvr>
+  <p:timing>
+    <p:tnLst>
+      <p:par>
+        <p:cTn id="1" dur="indefinite" restart="never" nodeType="tmRoot"/>
+      </p:par>
+    </p:tnLst>
+  </p:timing>
 </p:sld>
 </file>
 
@@ -5875,6 +5930,13 @@
   <p:clrMapOvr>
     <a:masterClrMapping/>
   </p:clrMapOvr>
+  <p:timing>
+    <p:tnLst>
+      <p:par>
+        <p:cTn id="1" dur="indefinite" restart="never" nodeType="tmRoot"/>
+      </p:par>
+    </p:tnLst>
+  </p:timing>
 </p:sld>
 </file>
 
@@ -6066,6 +6128,13 @@
   <p:clrMapOvr>
     <a:masterClrMapping/>
   </p:clrMapOvr>
+  <p:timing>
+    <p:tnLst>
+      <p:par>
+        <p:cTn id="1" dur="indefinite" restart="never" nodeType="tmRoot"/>
+      </p:par>
+    </p:tnLst>
+  </p:timing>
 </p:sld>
 </file>
 
@@ -6257,6 +6326,13 @@
   <p:clrMapOvr>
     <a:masterClrMapping/>
   </p:clrMapOvr>
+  <p:timing>
+    <p:tnLst>
+      <p:par>
+        <p:cTn id="1" dur="indefinite" restart="never" nodeType="tmRoot"/>
+      </p:par>
+    </p:tnLst>
+  </p:timing>
 </p:sld>
 </file>
 
@@ -6659,6 +6735,13 @@
   <p:clrMapOvr>
     <a:masterClrMapping/>
   </p:clrMapOvr>
+  <p:timing>
+    <p:tnLst>
+      <p:par>
+        <p:cTn id="1" dur="indefinite" restart="never" nodeType="tmRoot"/>
+      </p:par>
+    </p:tnLst>
+  </p:timing>
 </p:sld>
 </file>
 
@@ -6802,7 +6885,7 @@
                   </a:schemeClr>
                 </a:solidFill>
               </a:rPr>
-              <a:t>Vorgehensweise und Features</a:t>
+              <a:t>Vorgehensweise &amp; Features</a:t>
             </a:r>
             <a:endParaRPr lang="de-DE" b="1" dirty="0">
               <a:solidFill>
@@ -7256,18 +7339,7 @@
                   </a:schemeClr>
                 </a:solidFill>
               </a:rPr>
-              <a:t>Vorgehensweise und </a:t>
-            </a:r>
-            <a:r>
-              <a:rPr lang="de-DE" dirty="0" smtClean="0">
-                <a:solidFill>
-                  <a:schemeClr val="accent4">
-                    <a:lumMod val="65000"/>
-                    <a:lumOff val="35000"/>
-                  </a:schemeClr>
-                </a:solidFill>
-              </a:rPr>
-              <a:t>Features</a:t>
+              <a:t>Vorgehensweise &amp; Features</a:t>
             </a:r>
             <a:endParaRPr lang="de-DE" dirty="0">
               <a:solidFill>
@@ -7573,6 +7645,13 @@
   <p:clrMapOvr>
     <a:masterClrMapping/>
   </p:clrMapOvr>
+  <p:timing>
+    <p:tnLst>
+      <p:par>
+        <p:cTn id="1" dur="indefinite" restart="never" nodeType="tmRoot"/>
+      </p:par>
+    </p:tnLst>
+  </p:timing>
 </p:sld>
 </file>
 
@@ -7819,6 +7898,13 @@
   <p:clrMapOvr>
     <a:masterClrMapping/>
   </p:clrMapOvr>
+  <p:timing>
+    <p:tnLst>
+      <p:par>
+        <p:cTn id="1" dur="indefinite" restart="never" nodeType="tmRoot"/>
+      </p:par>
+    </p:tnLst>
+  </p:timing>
 </p:sld>
 </file>
 
@@ -8224,8 +8310,8 @@
         </p:nvSpPr>
         <p:spPr>
           <a:xfrm>
-            <a:off x="457216" y="3933056"/>
-            <a:ext cx="8229599" cy="471026"/>
+            <a:off x="457216" y="4142546"/>
+            <a:ext cx="8229599" cy="438582"/>
           </a:xfrm>
           <a:prstGeom prst="rect">
             <a:avLst/>
@@ -8246,7 +8332,7 @@
               </a:spcAft>
             </a:pPr>
             <a:r>
-              <a:rPr lang="de-DE" sz="2300" dirty="0">
+              <a:rPr lang="de-DE" sz="2200" dirty="0">
                 <a:solidFill>
                   <a:schemeClr val="bg1"/>
                 </a:solidFill>
@@ -8254,7 +8340,29 @@
                 <a:ea typeface="Calibri" panose="020F0502020204030204" pitchFamily="34" charset="0"/>
                 <a:cs typeface="Times New Roman" panose="02020603050405020304" pitchFamily="18" charset="0"/>
               </a:rPr>
-              <a:t>Entwicklung und Umsetzung eines Aufzugsmodell mittels C++</a:t>
+              <a:t>Entwicklung und </a:t>
+            </a:r>
+            <a:r>
+              <a:rPr lang="de-DE" sz="2200" dirty="0" smtClean="0">
+                <a:solidFill>
+                  <a:schemeClr val="bg1"/>
+                </a:solidFill>
+                <a:latin typeface="Calibri" panose="020F0502020204030204" pitchFamily="34" charset="0"/>
+                <a:ea typeface="Calibri" panose="020F0502020204030204" pitchFamily="34" charset="0"/>
+                <a:cs typeface="Times New Roman" panose="02020603050405020304" pitchFamily="18" charset="0"/>
+              </a:rPr>
+              <a:t>Implementierung einer Aufzugsteuerung </a:t>
+            </a:r>
+            <a:r>
+              <a:rPr lang="de-DE" sz="2200" dirty="0">
+                <a:solidFill>
+                  <a:schemeClr val="bg1"/>
+                </a:solidFill>
+                <a:latin typeface="Calibri" panose="020F0502020204030204" pitchFamily="34" charset="0"/>
+                <a:ea typeface="Calibri" panose="020F0502020204030204" pitchFamily="34" charset="0"/>
+                <a:cs typeface="Times New Roman" panose="02020603050405020304" pitchFamily="18" charset="0"/>
+              </a:rPr>
+              <a:t>mittels C++</a:t>
             </a:r>
           </a:p>
         </p:txBody>
@@ -8464,32 +8572,15 @@
           <a:p>
             <a:r>
               <a:rPr lang="de-DE" dirty="0" smtClean="0"/>
-              <a:t>Konzeptentwicklung in </a:t>
-            </a:r>
+              <a:t>Konzeptentwicklung in UML</a:t>
+            </a:r>
+          </a:p>
+          <a:p>
+            <a:pPr lvl="1"/>
             <a:r>
               <a:rPr lang="de-DE" dirty="0" smtClean="0"/>
-              <a:t>UML</a:t>
-            </a:r>
-          </a:p>
-          <a:p>
-            <a:pPr lvl="1"/>
-            <a:r>
-              <a:rPr lang="de-DE" dirty="0" smtClean="0"/>
-              <a:t>Arbeitsaufteilung nach </a:t>
-            </a:r>
-            <a:r>
-              <a:rPr lang="de-DE" dirty="0" smtClean="0"/>
-              <a:t>Klassen und </a:t>
-            </a:r>
-            <a:r>
-              <a:rPr lang="de-DE" dirty="0" smtClean="0"/>
-              <a:t>Festlegen der </a:t>
-            </a:r>
-            <a:r>
-              <a:rPr lang="de-DE" dirty="0" smtClean="0"/>
-              <a:t>Schnittstellen</a:t>
-            </a:r>
-            <a:endParaRPr lang="de-DE" dirty="0" smtClean="0"/>
+              <a:t>Arbeitsaufteilung nach Klassen und Festlegen der Schnittstellen</a:t>
+            </a:r>
           </a:p>
           <a:p>
             <a:pPr lvl="1"/>
@@ -8522,11 +8613,7 @@
             </a:r>
             <a:r>
               <a:rPr lang="de-DE" dirty="0" smtClean="0"/>
-              <a:t> </a:t>
-            </a:r>
-            <a:r>
-              <a:rPr lang="de-DE" dirty="0" smtClean="0"/>
-              <a:t>Systems </a:t>
+              <a:t> Systems </a:t>
             </a:r>
             <a:r>
               <a:rPr lang="de-DE" dirty="0" err="1" smtClean="0"/>
@@ -8789,41 +8876,8 @@
               <a:rPr lang="de-DE" dirty="0" smtClean="0">
                 <a:cs typeface="Calibri" pitchFamily="34" charset="0"/>
               </a:rPr>
-              <a:t>Clean: </a:t>
-            </a:r>
-            <a:r>
-              <a:rPr lang="de-DE" dirty="0" smtClean="0">
-                <a:cs typeface="Calibri" pitchFamily="34" charset="0"/>
-              </a:rPr>
-              <a:t>Verwendung </a:t>
-            </a:r>
-            <a:r>
-              <a:rPr lang="de-DE" dirty="0" smtClean="0">
-                <a:cs typeface="Calibri" pitchFamily="34" charset="0"/>
-              </a:rPr>
-              <a:t>sprechender </a:t>
-            </a:r>
-            <a:r>
-              <a:rPr lang="de-DE" dirty="0" smtClean="0">
-                <a:cs typeface="Calibri" pitchFamily="34" charset="0"/>
-              </a:rPr>
-              <a:t>Methoden- </a:t>
-            </a:r>
-            <a:r>
-              <a:rPr lang="de-DE" dirty="0" smtClean="0">
-                <a:cs typeface="Calibri" pitchFamily="34" charset="0"/>
-              </a:rPr>
-              <a:t>und </a:t>
-            </a:r>
-            <a:r>
-              <a:rPr lang="de-DE" dirty="0" smtClean="0">
-                <a:cs typeface="Calibri" pitchFamily="34" charset="0"/>
-              </a:rPr>
-              <a:t>Variablennamen</a:t>
-            </a:r>
-            <a:endParaRPr lang="de-DE" dirty="0" smtClean="0">
-              <a:cs typeface="Calibri" pitchFamily="34" charset="0"/>
-            </a:endParaRPr>
+              <a:t>Clean: Verwendung sprechender Methoden- und Variablennamen</a:t>
+            </a:r>
           </a:p>
           <a:p>
             <a:endParaRPr lang="de-DE" dirty="0"/>
@@ -8869,6 +8923,13 @@
   <p:clrMapOvr>
     <a:masterClrMapping/>
   </p:clrMapOvr>
+  <p:timing>
+    <p:tnLst>
+      <p:par>
+        <p:cTn id="1" dur="indefinite" restart="never" nodeType="tmRoot"/>
+      </p:par>
+    </p:tnLst>
+  </p:timing>
 </p:sld>
 </file>
 
@@ -9012,7 +9073,7 @@
                   </a:schemeClr>
                 </a:solidFill>
               </a:rPr>
-              <a:t>Vorgehensweise und Features</a:t>
+              <a:t>Vorgehensweise &amp; Features</a:t>
             </a:r>
           </a:p>
           <a:p>
@@ -9040,21 +9101,10 @@
                   </a:schemeClr>
                 </a:solidFill>
               </a:rPr>
-              <a:t>Klassenübersicht </a:t>
-            </a:r>
-            <a:r>
-              <a:rPr lang="de-DE" b="1" dirty="0">
-                <a:solidFill>
-                  <a:schemeClr val="accent4">
-                    <a:lumMod val="65000"/>
-                    <a:lumOff val="35000"/>
-                  </a:schemeClr>
-                </a:solidFill>
-              </a:rPr>
-              <a:t>&amp; </a:t>
-            </a:r>
-            <a:r>
-              <a:rPr lang="de-DE" b="1" dirty="0" err="1">
+              <a:t>Klassenübersicht &amp; </a:t>
+            </a:r>
+            <a:r>
+              <a:rPr lang="de-DE" b="1" dirty="0" err="1" smtClean="0">
                 <a:solidFill>
                   <a:schemeClr val="accent4">
                     <a:lumMod val="65000"/>
@@ -9318,6 +9368,13 @@
   <p:clrMapOvr>
     <a:masterClrMapping/>
   </p:clrMapOvr>
+  <p:timing>
+    <p:tnLst>
+      <p:par>
+        <p:cTn id="1" dur="indefinite" restart="never" nodeType="tmRoot"/>
+      </p:par>
+    </p:tnLst>
+  </p:timing>
 </p:sld>
 </file>
 
@@ -9512,6 +9569,13 @@
   <p:clrMapOvr>
     <a:masterClrMapping/>
   </p:clrMapOvr>
+  <p:timing>
+    <p:tnLst>
+      <p:par>
+        <p:cTn id="1" dur="indefinite" restart="never" nodeType="tmRoot"/>
+      </p:par>
+    </p:tnLst>
+  </p:timing>
 </p:sld>
 </file>
 
@@ -9666,26 +9730,34 @@
       </p:sp>
       <p:pic>
         <p:nvPicPr>
-          <p:cNvPr id="7" name="Grafik 6"/>
+          <p:cNvPr id="1026" name="Picture 2"/>
           <p:cNvPicPr>
-            <a:picLocks noChangeAspect="1"/>
+            <a:picLocks noChangeAspect="1" noChangeArrowheads="1"/>
           </p:cNvPicPr>
           <p:nvPr/>
         </p:nvPicPr>
         <p:blipFill>
           <a:blip r:embed="rId2"/>
+          <a:srcRect/>
           <a:stretch>
             <a:fillRect/>
           </a:stretch>
         </p:blipFill>
-        <p:spPr>
-          <a:xfrm>
-            <a:off x="1261781" y="1428448"/>
-            <a:ext cx="6620438" cy="4232800"/>
+        <p:spPr bwMode="auto">
+          <a:xfrm>
+            <a:off x="845077" y="1409700"/>
+            <a:ext cx="7232797" cy="4611588"/>
           </a:xfrm>
           <a:prstGeom prst="rect">
             <a:avLst/>
           </a:prstGeom>
+          <a:noFill/>
+          <a:ln w="9525">
+            <a:noFill/>
+            <a:miter lim="800000"/>
+            <a:headEnd/>
+            <a:tailEnd/>
+          </a:ln>
         </p:spPr>
       </p:pic>
     </p:spTree>
@@ -9698,6 +9770,13 @@
   <p:clrMapOvr>
     <a:masterClrMapping/>
   </p:clrMapOvr>
+  <p:timing>
+    <p:tnLst>
+      <p:par>
+        <p:cTn id="1" dur="indefinite" restart="never" nodeType="tmRoot"/>
+      </p:par>
+    </p:tnLst>
+  </p:timing>
 </p:sld>
 </file>
 
@@ -9947,9 +10026,10 @@
           <a:lstStyle/>
           <a:p>
             <a:r>
-              <a:rPr lang="de-DE" dirty="0"/>
-              <a:t>Probleme</a:t>
-            </a:r>
+              <a:rPr lang="de-DE" dirty="0" smtClean="0"/>
+              <a:t>Herausforderungen</a:t>
+            </a:r>
+            <a:endParaRPr lang="de-DE" dirty="0"/>
           </a:p>
         </p:txBody>
       </p:sp>

</xml_diff>

<commit_message>
Überarbeitung Kapitel 4 Präsentation ohne ausgeblende Folien erstellt
</commit_message>
<xml_diff>
--- a/Präsentation.pptx
+++ b/Präsentation.pptx
@@ -227,7 +227,7 @@
       </p14:sectionLst>
     </p:ext>
     <p:ext uri="{EFAFB233-063F-42B5-8137-9DF3F51BA10A}">
-      <p15:sldGuideLst xmlns="" xmlns:p15="http://schemas.microsoft.com/office/powerpoint/2012/main">
+      <p15:sldGuideLst xmlns:p15="http://schemas.microsoft.com/office/powerpoint/2012/main">
         <p15:guide id="1" orient="horz" pos="935" userDrawn="1">
           <p15:clr>
             <a:srgbClr val="A4A3A4"/>
@@ -241,7 +241,7 @@
       </p15:sldGuideLst>
     </p:ext>
     <p:ext uri="{2D200454-40CA-4A62-9FC3-DE9A4176ACB9}">
-      <p15:notesGuideLst xmlns="" xmlns:p15="http://schemas.microsoft.com/office/powerpoint/2012/main">
+      <p15:notesGuideLst xmlns:p15="http://schemas.microsoft.com/office/powerpoint/2012/main">
         <p15:guide id="1" orient="horz" pos="3132">
           <p15:clr>
             <a:srgbClr val="A4A3A4"/>
@@ -1092,19 +1092,19 @@
           <a:lstStyle/>
           <a:p>
             <a:r>
-              <a:rPr lang="de-DE" dirty="0" smtClean="0"/>
+              <a:rPr lang="de-DE" dirty="0"/>
               <a:t>Hier Vorführen der Features Intelligent</a:t>
             </a:r>
             <a:r>
-              <a:rPr lang="de-DE" baseline="0" dirty="0" smtClean="0"/>
+              <a:rPr lang="de-DE" baseline="0" dirty="0"/>
               <a:t> und Komfortabel an der Simulation, sowie Aufzeigen der </a:t>
             </a:r>
             <a:r>
-              <a:rPr lang="de-DE" baseline="0" dirty="0" err="1" smtClean="0"/>
+              <a:rPr lang="de-DE" baseline="0" dirty="0" err="1"/>
               <a:t>allgm</a:t>
             </a:r>
             <a:r>
-              <a:rPr lang="de-DE" baseline="0" dirty="0" smtClean="0"/>
+              <a:rPr lang="de-DE" baseline="0" dirty="0"/>
               <a:t>. Funktionsweise der Positions- und Richtungsleuchten</a:t>
             </a:r>
             <a:endParaRPr lang="de-DE" dirty="0"/>
@@ -1883,7 +1883,7 @@
   </p:clrMapOvr>
   <p:extLst mod="1">
     <p:ext uri="{DCECCB84-F9BA-43D5-87BE-67443E8EF086}">
-      <p15:sldGuideLst xmlns="" xmlns:p15="http://schemas.microsoft.com/office/powerpoint/2012/main">
+      <p15:sldGuideLst xmlns:p15="http://schemas.microsoft.com/office/powerpoint/2012/main">
         <p15:guide id="1" orient="horz" pos="2160" userDrawn="1">
           <p15:clr>
             <a:srgbClr val="FBAE40"/>
@@ -4409,29 +4409,7 @@
                 <a:ea typeface="Calibri" panose="020F0502020204030204" pitchFamily="34" charset="0"/>
                 <a:cs typeface="Times New Roman" panose="02020603050405020304" pitchFamily="18" charset="0"/>
               </a:rPr>
-              <a:t>Entwicklung und </a:t>
-            </a:r>
-            <a:r>
-              <a:rPr lang="de-DE" sz="2200" dirty="0" smtClean="0">
-                <a:solidFill>
-                  <a:schemeClr val="bg1"/>
-                </a:solidFill>
-                <a:latin typeface="Calibri" panose="020F0502020204030204" pitchFamily="34" charset="0"/>
-                <a:ea typeface="Calibri" panose="020F0502020204030204" pitchFamily="34" charset="0"/>
-                <a:cs typeface="Times New Roman" panose="02020603050405020304" pitchFamily="18" charset="0"/>
-              </a:rPr>
-              <a:t>Implementierung einer Aufzugssteuerung </a:t>
-            </a:r>
-            <a:r>
-              <a:rPr lang="de-DE" sz="2200" dirty="0">
-                <a:solidFill>
-                  <a:schemeClr val="bg1"/>
-                </a:solidFill>
-                <a:latin typeface="Calibri" panose="020F0502020204030204" pitchFamily="34" charset="0"/>
-                <a:ea typeface="Calibri" panose="020F0502020204030204" pitchFamily="34" charset="0"/>
-                <a:cs typeface="Times New Roman" panose="02020603050405020304" pitchFamily="18" charset="0"/>
-              </a:rPr>
-              <a:t>mittels C++</a:t>
+              <a:t>Entwicklung und Implementierung einer Aufzugssteuerung mittels C++</a:t>
             </a:r>
             <a:br>
               <a:rPr lang="de-DE" sz="2200" dirty="0">
@@ -4537,7 +4515,7 @@
         <p:spPr bwMode="auto">
           <a:xfrm>
             <a:off x="552093" y="2276888"/>
-            <a:ext cx="8085762" cy="862481"/>
+            <a:ext cx="8002781" cy="862481"/>
           </a:xfrm>
           <a:prstGeom prst="rect">
             <a:avLst/>
@@ -4751,13 +4729,6 @@
   <p:clrMapOvr>
     <a:masterClrMapping/>
   </p:clrMapOvr>
-  <p:timing>
-    <p:tnLst>
-      <p:par>
-        <p:cTn id="1" dur="indefinite" restart="never" nodeType="tmRoot"/>
-      </p:par>
-    </p:tnLst>
-  </p:timing>
 </p:sld>
 </file>
 
@@ -4971,13 +4942,6 @@
   <p:clrMapOvr>
     <a:masterClrMapping/>
   </p:clrMapOvr>
-  <p:timing>
-    <p:tnLst>
-      <p:par>
-        <p:cTn id="1" dur="indefinite" restart="never" nodeType="tmRoot"/>
-      </p:par>
-    </p:tnLst>
-  </p:timing>
 </p:sld>
 </file>
 
@@ -5464,7 +5428,7 @@
         <p:spPr bwMode="auto">
           <a:xfrm>
             <a:off x="565632" y="4005080"/>
-            <a:ext cx="8085762" cy="862481"/>
+            <a:ext cx="7987945" cy="862481"/>
           </a:xfrm>
           <a:prstGeom prst="rect">
             <a:avLst/>
@@ -5678,13 +5642,7 @@
   <p:clrMapOvr>
     <a:masterClrMapping/>
   </p:clrMapOvr>
-  <p:timing>
-    <p:tnLst>
-      <p:par>
-        <p:cTn id="1" dur="indefinite" restart="never" nodeType="tmRoot"/>
-      </p:par>
-    </p:tnLst>
-  </p:timing>
+  <p:transition/>
 </p:sld>
 </file>
 
@@ -5714,7 +5672,7 @@
         <p:spPr bwMode="auto">
           <a:xfrm>
             <a:off x="565632" y="2834264"/>
-            <a:ext cx="8085762" cy="2033283"/>
+            <a:ext cx="7987945" cy="2033283"/>
           </a:xfrm>
           <a:prstGeom prst="rect">
             <a:avLst/>
@@ -5927,13 +5885,6 @@
   <p:clrMapOvr>
     <a:masterClrMapping/>
   </p:clrMapOvr>
-  <p:timing>
-    <p:tnLst>
-      <p:par>
-        <p:cTn id="1" dur="indefinite" restart="never" nodeType="tmRoot"/>
-      </p:par>
-    </p:tnLst>
-  </p:timing>
 </p:sld>
 </file>
 
@@ -6125,18 +6076,11 @@
   <p:clrMapOvr>
     <a:masterClrMapping/>
   </p:clrMapOvr>
-  <p:timing>
-    <p:tnLst>
-      <p:par>
-        <p:cTn id="1" dur="indefinite" restart="never" nodeType="tmRoot"/>
-      </p:par>
-    </p:tnLst>
-  </p:timing>
 </p:sld>
 </file>
 
 <file path=ppt/slides/slide17.xml><?xml version="1.0" encoding="utf-8"?>
-<p:sld xmlns:a="http://schemas.openxmlformats.org/drawingml/2006/main" xmlns:r="http://schemas.openxmlformats.org/officeDocument/2006/relationships" xmlns:p="http://schemas.openxmlformats.org/presentationml/2006/main">
+<p:sld xmlns:a="http://schemas.openxmlformats.org/drawingml/2006/main" xmlns:r="http://schemas.openxmlformats.org/officeDocument/2006/relationships" xmlns:p="http://schemas.openxmlformats.org/presentationml/2006/main" show="0">
   <p:cSld>
     <p:spTree>
       <p:nvGrpSpPr>
@@ -6323,13 +6267,7 @@
   <p:clrMapOvr>
     <a:masterClrMapping/>
   </p:clrMapOvr>
-  <p:timing>
-    <p:tnLst>
-      <p:par>
-        <p:cTn id="1" dur="indefinite" restart="never" nodeType="tmRoot"/>
-      </p:par>
-    </p:tnLst>
-  </p:timing>
+  <p:transition/>
 </p:sld>
 </file>
 
@@ -6620,7 +6558,7 @@
               <a:defRPr/>
             </a:pPr>
             <a:r>
-              <a:rPr lang="de-DE" smtClean="0">
+              <a:rPr lang="de-DE">
                 <a:solidFill>
                   <a:schemeClr val="accent4">
                     <a:lumMod val="65000"/>
@@ -6630,14 +6568,6 @@
               </a:rPr>
               <a:t>Vorgehensweise und Features</a:t>
             </a:r>
-            <a:endParaRPr lang="de-DE">
-              <a:solidFill>
-                <a:schemeClr val="accent4">
-                  <a:lumMod val="65000"/>
-                  <a:lumOff val="35000"/>
-                </a:schemeClr>
-              </a:solidFill>
-            </a:endParaRPr>
           </a:p>
           <a:p>
             <a:pPr marL="1160463" indent="-1160463">
@@ -6762,7 +6692,7 @@
               <a:defRPr/>
             </a:pPr>
             <a:r>
-              <a:rPr lang="de-DE" b="1" smtClean="0">
+              <a:rPr lang="de-DE" b="1">
                 <a:solidFill>
                   <a:schemeClr val="accent4">
                     <a:lumMod val="65000"/>
@@ -6772,14 +6702,6 @@
               </a:rPr>
               <a:t>Etagenlogik</a:t>
             </a:r>
-            <a:endParaRPr lang="de-DE" b="1">
-              <a:solidFill>
-                <a:schemeClr val="accent4">
-                  <a:lumMod val="65000"/>
-                  <a:lumOff val="35000"/>
-                </a:schemeClr>
-              </a:solidFill>
-            </a:endParaRPr>
           </a:p>
           <a:p>
             <a:pPr marL="1160463" indent="-1160463">
@@ -6934,13 +6856,6 @@
   <p:clrMapOvr>
     <a:masterClrMapping/>
   </p:clrMapOvr>
-  <p:timing>
-    <p:tnLst>
-      <p:par>
-        <p:cTn id="1" dur="indefinite" restart="never" nodeType="tmRoot"/>
-      </p:par>
-    </p:tnLst>
-  </p:timing>
 </p:sld>
 </file>
 
@@ -7076,7 +6991,7 @@
               <a:defRPr/>
             </a:pPr>
             <a:r>
-              <a:rPr lang="de-DE" b="1" dirty="0" smtClean="0">
+              <a:rPr lang="de-DE" b="1" dirty="0">
                 <a:solidFill>
                   <a:schemeClr val="accent4">
                     <a:lumMod val="65000"/>
@@ -7086,14 +7001,6 @@
               </a:rPr>
               <a:t>Vorgehensweise &amp; Features</a:t>
             </a:r>
-            <a:endParaRPr lang="de-DE" b="1" dirty="0">
-              <a:solidFill>
-                <a:schemeClr val="accent4">
-                  <a:lumMod val="65000"/>
-                  <a:lumOff val="35000"/>
-                </a:schemeClr>
-              </a:solidFill>
-            </a:endParaRPr>
           </a:p>
           <a:p>
             <a:pPr marL="1160463" indent="-1160463">
@@ -7642,13 +7549,6 @@
   <p:clrMapOvr>
     <a:masterClrMapping/>
   </p:clrMapOvr>
-  <p:timing>
-    <p:tnLst>
-      <p:par>
-        <p:cTn id="1" dur="indefinite" restart="never" nodeType="tmRoot"/>
-      </p:par>
-    </p:tnLst>
-  </p:timing>
 </p:sld>
 </file>
 
@@ -7685,10 +7585,9 @@
           <a:lstStyle/>
           <a:p>
             <a:r>
-              <a:rPr lang="de-DE" smtClean="0"/>
+              <a:rPr lang="de-DE"/>
               <a:t>Etagenlogik</a:t>
             </a:r>
-            <a:endParaRPr lang="de-DE"/>
           </a:p>
         </p:txBody>
       </p:sp>
@@ -7826,13 +7725,13 @@
               <a:buNone/>
             </a:pPr>
             <a:r>
-              <a:rPr lang="de-DE" smtClean="0"/>
+              <a:rPr lang="de-DE"/>
               <a:t>Probleme</a:t>
             </a:r>
           </a:p>
           <a:p>
             <a:r>
-              <a:rPr lang="de-DE" smtClean="0"/>
+              <a:rPr lang="de-DE"/>
               <a:t>Keine elegante Umsetzung durch verschachtelte while-Schleifen</a:t>
             </a:r>
           </a:p>
@@ -7841,26 +7740,21 @@
               <a:buSzPct val="120000"/>
             </a:pPr>
             <a:r>
-              <a:rPr lang="de-DE" smtClean="0"/>
-              <a:t>Wenn auf einer Etage angekommen: </a:t>
-            </a:r>
-            <a:r>
               <a:rPr lang="de-DE"/>
-              <a:t>Tür soll öffnen -&gt; while-Schleife wartet </a:t>
-            </a:r>
-          </a:p>
-          <a:p>
-            <a:endParaRPr lang="de-DE" smtClean="0"/>
+              <a:t>Wenn auf einer Etage angekommen: Tür soll öffnen -&gt; while-Schleife wartet </a:t>
+            </a:r>
+          </a:p>
+          <a:p>
+            <a:endParaRPr lang="de-DE"/>
           </a:p>
           <a:p>
             <a:pPr marL="363538" lvl="1" indent="0">
               <a:buNone/>
             </a:pPr>
             <a:r>
-              <a:rPr lang="de-DE" smtClean="0"/>
+              <a:rPr lang="de-DE"/>
               <a:t>	</a:t>
             </a:r>
-            <a:endParaRPr lang="de-DE"/>
           </a:p>
           <a:p>
             <a:pPr marL="0" indent="0">
@@ -8021,18 +7915,13 @@
           <a:lstStyle/>
           <a:p>
             <a:r>
-              <a:rPr lang="de-DE" smtClean="0">
+              <a:rPr lang="de-DE">
                 <a:solidFill>
                   <a:srgbClr val="FF0000"/>
                 </a:solidFill>
               </a:rPr>
               <a:t>So keine parallele Erkennung von z.B. weiteren Ruftastereingaben möglich, das Programm ist lokal „pausiert“</a:t>
             </a:r>
-            <a:endParaRPr lang="de-DE">
-              <a:solidFill>
-                <a:srgbClr val="FF0000"/>
-              </a:solidFill>
-            </a:endParaRPr>
           </a:p>
         </p:txBody>
       </p:sp>
@@ -8214,10 +8103,9 @@
           <a:lstStyle/>
           <a:p>
             <a:r>
-              <a:rPr lang="de-DE" smtClean="0"/>
+              <a:rPr lang="de-DE"/>
               <a:t>Etagenlogik</a:t>
             </a:r>
-            <a:endParaRPr lang="de-DE"/>
           </a:p>
         </p:txBody>
       </p:sp>
@@ -8355,29 +8243,28 @@
               <a:buNone/>
             </a:pPr>
             <a:r>
-              <a:rPr lang="de-DE" smtClean="0"/>
+              <a:rPr lang="de-DE"/>
               <a:t>Lösung</a:t>
             </a:r>
           </a:p>
           <a:p>
             <a:r>
-              <a:rPr lang="de-DE" smtClean="0"/>
+              <a:rPr lang="de-DE"/>
               <a:t>Ständiges „Hineinspringen“ aus der main()</a:t>
             </a:r>
           </a:p>
           <a:p>
             <a:r>
-              <a:rPr lang="de-DE" smtClean="0"/>
+              <a:rPr lang="de-DE"/>
               <a:t>Ausführungslogik über Klassenvariable FloorStatus</a:t>
             </a:r>
           </a:p>
           <a:p>
             <a:pPr lvl="1"/>
             <a:r>
-              <a:rPr lang="de-DE" smtClean="0"/>
+              <a:rPr lang="de-DE"/>
               <a:t>Nur aktueller Schritt wird durchgeführt und zurückspringen in die main</a:t>
             </a:r>
-            <a:endParaRPr lang="de-DE"/>
           </a:p>
           <a:p>
             <a:endParaRPr lang="de-DE"/>
@@ -8400,13 +8287,6 @@
   <p:clrMapOvr>
     <a:masterClrMapping/>
   </p:clrMapOvr>
-  <p:timing>
-    <p:tnLst>
-      <p:par>
-        <p:cTn id="1" dur="indefinite" restart="never" nodeType="tmRoot"/>
-      </p:par>
-    </p:tnLst>
-  </p:timing>
 </p:sld>
 </file>
 
@@ -8443,10 +8323,9 @@
           <a:lstStyle/>
           <a:p>
             <a:r>
-              <a:rPr lang="de-DE" smtClean="0"/>
+              <a:rPr lang="de-DE"/>
               <a:t>Etagenlogik</a:t>
             </a:r>
-            <a:endParaRPr lang="de-DE"/>
           </a:p>
         </p:txBody>
       </p:sp>
@@ -8624,13 +8503,6 @@
   <p:clrMapOvr>
     <a:masterClrMapping/>
   </p:clrMapOvr>
-  <p:timing>
-    <p:tnLst>
-      <p:par>
-        <p:cTn id="1" dur="indefinite" restart="never" nodeType="tmRoot"/>
-      </p:par>
-    </p:tnLst>
-  </p:timing>
 </p:sld>
 </file>
 
@@ -8766,7 +8638,7 @@
               <a:defRPr/>
             </a:pPr>
             <a:r>
-              <a:rPr lang="de-DE" dirty="0" smtClean="0">
+              <a:rPr lang="de-DE" dirty="0">
                 <a:solidFill>
                   <a:schemeClr val="accent4">
                     <a:lumMod val="65000"/>
@@ -8776,14 +8648,6 @@
               </a:rPr>
               <a:t>Vorgehensweise &amp; Features</a:t>
             </a:r>
-            <a:endParaRPr lang="de-DE" dirty="0">
-              <a:solidFill>
-                <a:schemeClr val="accent4">
-                  <a:lumMod val="65000"/>
-                  <a:lumOff val="35000"/>
-                </a:schemeClr>
-              </a:solidFill>
-            </a:endParaRPr>
           </a:p>
           <a:p>
             <a:pPr marL="1160463" indent="-1160463">
@@ -9080,13 +8944,6 @@
   <p:clrMapOvr>
     <a:masterClrMapping/>
   </p:clrMapOvr>
-  <p:timing>
-    <p:tnLst>
-      <p:par>
-        <p:cTn id="1" dur="indefinite" restart="never" nodeType="tmRoot"/>
-      </p:par>
-    </p:tnLst>
-  </p:timing>
 </p:sld>
 </file>
 
@@ -9301,7 +9158,7 @@
           <a:p>
             <a:r>
               <a:rPr lang="de-DE" dirty="0"/>
-              <a:t>Logischere Umsetzung der </a:t>
+              <a:t>Logische Umsetzung der </a:t>
             </a:r>
             <a:r>
               <a:rPr lang="de-DE" dirty="0" err="1"/>
@@ -9333,13 +9190,6 @@
   <p:clrMapOvr>
     <a:masterClrMapping/>
   </p:clrMapOvr>
-  <p:timing>
-    <p:tnLst>
-      <p:par>
-        <p:cTn id="1" dur="indefinite" restart="never" nodeType="tmRoot"/>
-      </p:par>
-    </p:tnLst>
-  </p:timing>
 </p:sld>
 </file>
 
@@ -9775,29 +9625,7 @@
                 <a:ea typeface="Calibri" panose="020F0502020204030204" pitchFamily="34" charset="0"/>
                 <a:cs typeface="Times New Roman" panose="02020603050405020304" pitchFamily="18" charset="0"/>
               </a:rPr>
-              <a:t>Entwicklung und </a:t>
-            </a:r>
-            <a:r>
-              <a:rPr lang="de-DE" sz="2200" dirty="0" smtClean="0">
-                <a:solidFill>
-                  <a:schemeClr val="bg1"/>
-                </a:solidFill>
-                <a:latin typeface="Calibri" panose="020F0502020204030204" pitchFamily="34" charset="0"/>
-                <a:ea typeface="Calibri" panose="020F0502020204030204" pitchFamily="34" charset="0"/>
-                <a:cs typeface="Times New Roman" panose="02020603050405020304" pitchFamily="18" charset="0"/>
-              </a:rPr>
-              <a:t>Implementierung einer Aufzugsteuerung </a:t>
-            </a:r>
-            <a:r>
-              <a:rPr lang="de-DE" sz="2200" dirty="0">
-                <a:solidFill>
-                  <a:schemeClr val="bg1"/>
-                </a:solidFill>
-                <a:latin typeface="Calibri" panose="020F0502020204030204" pitchFamily="34" charset="0"/>
-                <a:ea typeface="Calibri" panose="020F0502020204030204" pitchFamily="34" charset="0"/>
-                <a:cs typeface="Times New Roman" panose="02020603050405020304" pitchFamily="18" charset="0"/>
-              </a:rPr>
-              <a:t>mittels C++</a:t>
+              <a:t>Entwicklung und Implementierung einer Aufzugsteuerung mittels C++</a:t>
             </a:r>
           </a:p>
         </p:txBody>
@@ -9871,10 +9699,9 @@
           <a:lstStyle/>
           <a:p>
             <a:r>
-              <a:rPr lang="de-DE" dirty="0" smtClean="0"/>
+              <a:rPr lang="de-DE" dirty="0"/>
               <a:t>Vorgehensweise  bei der Entwicklung</a:t>
             </a:r>
-            <a:endParaRPr lang="de-DE" dirty="0"/>
           </a:p>
         </p:txBody>
       </p:sp>
@@ -10006,79 +9833,71 @@
           <a:lstStyle/>
           <a:p>
             <a:r>
-              <a:rPr lang="de-DE" dirty="0" smtClean="0"/>
+              <a:rPr lang="de-DE" dirty="0"/>
               <a:t>Konzeptentwicklung in UML</a:t>
             </a:r>
           </a:p>
           <a:p>
             <a:pPr lvl="1"/>
             <a:r>
-              <a:rPr lang="de-DE" dirty="0" smtClean="0"/>
+              <a:rPr lang="de-DE" dirty="0"/>
               <a:t>Arbeitsaufteilung nach Klassen und Festlegen der Schnittstellen</a:t>
             </a:r>
           </a:p>
           <a:p>
             <a:pPr lvl="1"/>
             <a:r>
-              <a:rPr lang="de-DE" dirty="0" smtClean="0"/>
+              <a:rPr lang="de-DE" dirty="0"/>
               <a:t>Einheitliche Definition wichtiger Methoden- und Variablennamen</a:t>
             </a:r>
           </a:p>
           <a:p>
             <a:r>
-              <a:rPr lang="de-DE" dirty="0" smtClean="0"/>
+              <a:rPr lang="de-DE" dirty="0"/>
               <a:t>Einsatz der Programmiersprache C++ in der</a:t>
             </a:r>
             <a:br>
-              <a:rPr lang="de-DE" dirty="0" smtClean="0"/>
+              <a:rPr lang="de-DE" dirty="0"/>
             </a:br>
             <a:r>
-              <a:rPr lang="de-DE" dirty="0" smtClean="0"/>
+              <a:rPr lang="de-DE" dirty="0"/>
               <a:t>Entwicklungsumgebung Code::Blocks</a:t>
             </a:r>
           </a:p>
           <a:p>
             <a:r>
-              <a:rPr lang="de-DE" dirty="0" smtClean="0"/>
+              <a:rPr lang="de-DE" dirty="0"/>
               <a:t>Gemeinsame Verwendung des Version </a:t>
             </a:r>
             <a:r>
-              <a:rPr lang="de-DE" dirty="0" err="1" smtClean="0"/>
+              <a:rPr lang="de-DE" dirty="0" err="1"/>
               <a:t>Control</a:t>
             </a:r>
             <a:r>
-              <a:rPr lang="de-DE" dirty="0" smtClean="0"/>
+              <a:rPr lang="de-DE" dirty="0"/>
               <a:t> Systems </a:t>
             </a:r>
             <a:r>
-              <a:rPr lang="de-DE" dirty="0" err="1" smtClean="0"/>
+              <a:rPr lang="de-DE" dirty="0" err="1"/>
               <a:t>Git</a:t>
             </a:r>
-            <a:endParaRPr lang="de-DE" dirty="0" smtClean="0"/>
-          </a:p>
-          <a:p>
-            <a:r>
-              <a:rPr lang="de-DE" dirty="0" smtClean="0"/>
+            <a:endParaRPr lang="de-DE" dirty="0"/>
+          </a:p>
+          <a:p>
+            <a:r>
+              <a:rPr lang="de-DE" dirty="0"/>
               <a:t>Automatische Dokumentation der Software mit </a:t>
             </a:r>
             <a:r>
-              <a:rPr lang="de-DE" dirty="0" err="1" smtClean="0"/>
+              <a:rPr lang="de-DE" dirty="0" err="1"/>
               <a:t>Doxygen</a:t>
             </a:r>
-            <a:endParaRPr lang="de-DE" dirty="0" smtClean="0"/>
-          </a:p>
-          <a:p>
-            <a:r>
-              <a:rPr lang="de-DE" dirty="0" smtClean="0"/>
-              <a:t>Ziele</a:t>
-            </a:r>
+            <a:endParaRPr lang="de-DE" dirty="0"/>
+          </a:p>
+          <a:p>
             <a:r>
               <a:rPr lang="de-DE" dirty="0"/>
-              <a:t>: Einfacher, verständlicher </a:t>
-            </a:r>
-            <a:r>
-              <a:rPr lang="de-DE" dirty="0" smtClean="0"/>
-              <a:t>Code</a:t>
+              <a:t>Ziele: Einfacher, verständlicher Code</a:t>
             </a:r>
           </a:p>
         </p:txBody>
@@ -10225,10 +10044,9 @@
           <a:lstStyle/>
           <a:p>
             <a:r>
-              <a:rPr lang="de-DE" dirty="0" smtClean="0"/>
+              <a:rPr lang="de-DE" dirty="0"/>
               <a:t>Features der Software</a:t>
             </a:r>
-            <a:endParaRPr lang="de-DE" dirty="0"/>
           </a:p>
         </p:txBody>
       </p:sp>
@@ -10254,7 +10072,7 @@
           <a:p>
             <a:pPr lvl="0"/>
             <a:r>
-              <a:rPr lang="de-DE" dirty="0" smtClean="0">
+              <a:rPr lang="de-DE" dirty="0">
                 <a:cs typeface="Calibri" pitchFamily="34" charset="0"/>
               </a:rPr>
               <a:t>Intelligent: Abarbeitung der Aufrufe nach Fahrtrichtung</a:t>
@@ -10263,7 +10081,7 @@
           <a:p>
             <a:pPr lvl="0"/>
             <a:r>
-              <a:rPr lang="de-DE" dirty="0" smtClean="0">
+              <a:rPr lang="de-DE" dirty="0">
                 <a:cs typeface="Calibri" pitchFamily="34" charset="0"/>
               </a:rPr>
               <a:t>Komfortabel: sanftes Anfahren und Abbremsen</a:t>
@@ -10272,7 +10090,7 @@
           <a:p>
             <a:pPr lvl="0"/>
             <a:r>
-              <a:rPr lang="de-DE" dirty="0" smtClean="0">
+              <a:rPr lang="de-DE" dirty="0">
                 <a:cs typeface="Calibri" pitchFamily="34" charset="0"/>
               </a:rPr>
               <a:t>Anpassbar: Einfache Erweiterung mit weiteren Etagen</a:t>
@@ -10281,7 +10099,7 @@
           <a:p>
             <a:pPr lvl="0"/>
             <a:r>
-              <a:rPr lang="de-DE" dirty="0" smtClean="0">
+              <a:rPr lang="de-DE" dirty="0">
                 <a:cs typeface="Calibri" pitchFamily="34" charset="0"/>
               </a:rPr>
               <a:t>Sicher: Überwachung der Türen </a:t>
@@ -10290,7 +10108,7 @@
           <a:p>
             <a:pPr lvl="0"/>
             <a:r>
-              <a:rPr lang="de-DE" dirty="0" smtClean="0">
+              <a:rPr lang="de-DE" dirty="0">
                 <a:cs typeface="Calibri" pitchFamily="34" charset="0"/>
               </a:rPr>
               <a:t>Ausfallgesichert: Starten aus jeder Position möglich</a:t>
@@ -10299,7 +10117,7 @@
           <a:p>
             <a:pPr lvl="0"/>
             <a:r>
-              <a:rPr lang="de-DE" dirty="0" smtClean="0">
+              <a:rPr lang="de-DE" dirty="0">
                 <a:cs typeface="Calibri" pitchFamily="34" charset="0"/>
               </a:rPr>
               <a:t>Fehlerfrei: keine Fehlfunktionen</a:t>
@@ -10308,7 +10126,7 @@
           <a:p>
             <a:pPr lvl="0"/>
             <a:r>
-              <a:rPr lang="de-DE" dirty="0" smtClean="0">
+              <a:rPr lang="de-DE" dirty="0">
                 <a:cs typeface="Calibri" pitchFamily="34" charset="0"/>
               </a:rPr>
               <a:t>Clean: Verwendung sprechender Methoden- und Variablennamen</a:t>
@@ -10358,13 +10176,6 @@
   <p:clrMapOvr>
     <a:masterClrMapping/>
   </p:clrMapOvr>
-  <p:timing>
-    <p:tnLst>
-      <p:par>
-        <p:cTn id="1" dur="indefinite" restart="never" nodeType="tmRoot"/>
-      </p:par>
-    </p:tnLst>
-  </p:timing>
 </p:sld>
 </file>
 
@@ -10500,7 +10311,7 @@
               <a:defRPr/>
             </a:pPr>
             <a:r>
-              <a:rPr lang="de-DE" dirty="0" smtClean="0">
+              <a:rPr lang="de-DE" dirty="0">
                 <a:solidFill>
                   <a:schemeClr val="accent4">
                     <a:lumMod val="65000"/>
@@ -10528,7 +10339,7 @@
               <a:defRPr/>
             </a:pPr>
             <a:r>
-              <a:rPr lang="de-DE" b="1" dirty="0" smtClean="0">
+              <a:rPr lang="de-DE" b="1" dirty="0">
                 <a:solidFill>
                   <a:schemeClr val="accent4">
                     <a:lumMod val="65000"/>
@@ -10539,7 +10350,7 @@
               <a:t>Klassenübersicht &amp; </a:t>
             </a:r>
             <a:r>
-              <a:rPr lang="de-DE" b="1" dirty="0" err="1" smtClean="0">
+              <a:rPr lang="de-DE" b="1" dirty="0" err="1">
                 <a:solidFill>
                   <a:schemeClr val="accent4">
                     <a:lumMod val="65000"/>
@@ -10803,13 +10614,6 @@
   <p:clrMapOvr>
     <a:masterClrMapping/>
   </p:clrMapOvr>
-  <p:timing>
-    <p:tnLst>
-      <p:par>
-        <p:cTn id="1" dur="indefinite" restart="never" nodeType="tmRoot"/>
-      </p:par>
-    </p:tnLst>
-  </p:timing>
 </p:sld>
 </file>
 
@@ -11004,13 +10808,6 @@
   <p:clrMapOvr>
     <a:masterClrMapping/>
   </p:clrMapOvr>
-  <p:timing>
-    <p:tnLst>
-      <p:par>
-        <p:cTn id="1" dur="indefinite" restart="never" nodeType="tmRoot"/>
-      </p:par>
-    </p:tnLst>
-  </p:timing>
 </p:sld>
 </file>
 
@@ -11205,13 +11002,6 @@
   <p:clrMapOvr>
     <a:masterClrMapping/>
   </p:clrMapOvr>
-  <p:timing>
-    <p:tnLst>
-      <p:par>
-        <p:cTn id="1" dur="indefinite" restart="never" nodeType="tmRoot"/>
-      </p:par>
-    </p:tnLst>
-  </p:timing>
 </p:sld>
 </file>
 
@@ -11461,10 +11251,9 @@
           <a:lstStyle/>
           <a:p>
             <a:r>
-              <a:rPr lang="de-DE" dirty="0" smtClean="0"/>
+              <a:rPr lang="de-DE" dirty="0"/>
               <a:t>Herausforderungen</a:t>
             </a:r>
-            <a:endParaRPr lang="de-DE" dirty="0"/>
           </a:p>
         </p:txBody>
       </p:sp>

</xml_diff>